<commit_message>
added pictures for subtyping article
</commit_message>
<xml_diff>
--- a/themes/cayman-hugo-theme/static/Pictures for blog.pptx
+++ b/themes/cayman-hugo-theme/static/Pictures for blog.pptx
@@ -5,23 +5,24 @@
     <p:sldMasterId id="2147483648" r:id="rId2"/>
   </p:sldMasterIdLst>
   <p:notesMasterIdLst>
-    <p:notesMasterId r:id="rId14"/>
+    <p:notesMasterId r:id="rId15"/>
   </p:notesMasterIdLst>
   <p:handoutMasterIdLst>
-    <p:handoutMasterId r:id="rId15"/>
+    <p:handoutMasterId r:id="rId16"/>
   </p:handoutMasterIdLst>
   <p:sldIdLst>
     <p:sldId id="257" r:id="rId3"/>
-    <p:sldId id="266" r:id="rId4"/>
-    <p:sldId id="265" r:id="rId5"/>
-    <p:sldId id="264" r:id="rId6"/>
-    <p:sldId id="263" r:id="rId7"/>
-    <p:sldId id="262" r:id="rId8"/>
-    <p:sldId id="261" r:id="rId9"/>
-    <p:sldId id="260" r:id="rId10"/>
-    <p:sldId id="259" r:id="rId11"/>
-    <p:sldId id="258" r:id="rId12"/>
-    <p:sldId id="256" r:id="rId13"/>
+    <p:sldId id="267" r:id="rId4"/>
+    <p:sldId id="266" r:id="rId5"/>
+    <p:sldId id="265" r:id="rId6"/>
+    <p:sldId id="264" r:id="rId7"/>
+    <p:sldId id="263" r:id="rId8"/>
+    <p:sldId id="262" r:id="rId9"/>
+    <p:sldId id="261" r:id="rId10"/>
+    <p:sldId id="260" r:id="rId11"/>
+    <p:sldId id="259" r:id="rId12"/>
+    <p:sldId id="258" r:id="rId13"/>
+    <p:sldId id="256" r:id="rId14"/>
   </p:sldIdLst>
   <p:sldSz cx="12192000" cy="6858000"/>
   <p:notesSz cx="6858000" cy="9144000"/>
@@ -226,7 +227,7 @@
           <a:p>
             <a:fld id="{85F6B539-82EF-4B0A-81D6-A7AC15FDDE32}" type="datetimeFigureOut">
               <a:rPr lang="en-US" smtClean="0"/>
-              <a:t>9/15/2019</a:t>
+              <a:t>10/6/2019</a:t>
             </a:fld>
             <a:endParaRPr lang="en-US"/>
           </a:p>
@@ -403,7 +404,7 @@
           <a:p>
             <a:fld id="{DF849A96-36CF-49A5-9A4F-E58C3FF49857}" type="datetimeFigureOut">
               <a:rPr lang="en-US" smtClean="0"/>
-              <a:t>9/15/2019</a:t>
+              <a:t>10/6/2019</a:t>
             </a:fld>
             <a:endParaRPr lang="en-US"/>
           </a:p>
@@ -905,7 +906,7 @@
     </p:spTree>
     <p:extLst>
       <p:ext uri="{BB962C8B-B14F-4D97-AF65-F5344CB8AC3E}">
-        <p14:creationId xmlns:p14="http://schemas.microsoft.com/office/powerpoint/2010/main" val="4199135739"/>
+        <p14:creationId xmlns:p14="http://schemas.microsoft.com/office/powerpoint/2010/main" val="2883995183"/>
       </p:ext>
     </p:extLst>
   </p:cSld>
@@ -1019,6 +1020,128 @@
             <a:fld id="{FC1513FD-C785-4211-B2B0-BF864DB9E391}" type="slidenum">
               <a:rPr lang="en-US" smtClean="0"/>
               <a:t>11</a:t>
+            </a:fld>
+            <a:endParaRPr lang="en-US"/>
+          </a:p>
+        </p:txBody>
+      </p:sp>
+    </p:spTree>
+    <p:extLst>
+      <p:ext uri="{BB962C8B-B14F-4D97-AF65-F5344CB8AC3E}">
+        <p14:creationId xmlns:p14="http://schemas.microsoft.com/office/powerpoint/2010/main" val="4199135739"/>
+      </p:ext>
+    </p:extLst>
+  </p:cSld>
+  <p:clrMapOvr>
+    <a:masterClrMapping/>
+  </p:clrMapOvr>
+</p:notes>
+</file>
+
+<file path=ppt/notesSlides/notesSlide12.xml><?xml version="1.0" encoding="utf-8"?>
+<p:notes xmlns:a="http://schemas.openxmlformats.org/drawingml/2006/main" xmlns:r="http://schemas.openxmlformats.org/officeDocument/2006/relationships" xmlns:p="http://schemas.openxmlformats.org/presentationml/2006/main">
+  <p:cSld>
+    <p:spTree>
+      <p:nvGrpSpPr>
+        <p:cNvPr id="1" name=""/>
+        <p:cNvGrpSpPr/>
+        <p:nvPr/>
+      </p:nvGrpSpPr>
+      <p:grpSpPr>
+        <a:xfrm>
+          <a:off x="0" y="0"/>
+          <a:ext cx="0" cy="0"/>
+          <a:chOff x="0" y="0"/>
+          <a:chExt cx="0" cy="0"/>
+        </a:xfrm>
+      </p:grpSpPr>
+      <p:sp>
+        <p:nvSpPr>
+          <p:cNvPr id="2" name="Slide Image Placeholder 1"/>
+          <p:cNvSpPr>
+            <a:spLocks noGrp="1" noRot="1" noChangeAspect="1"/>
+          </p:cNvSpPr>
+          <p:nvPr>
+            <p:ph type="sldImg"/>
+          </p:nvPr>
+        </p:nvSpPr>
+        <p:spPr/>
+      </p:sp>
+      <p:sp>
+        <p:nvSpPr>
+          <p:cNvPr id="3" name="Notes Placeholder 2"/>
+          <p:cNvSpPr>
+            <a:spLocks noGrp="1"/>
+          </p:cNvSpPr>
+          <p:nvPr>
+            <p:ph type="body" idx="1"/>
+          </p:nvPr>
+        </p:nvSpPr>
+        <p:spPr/>
+        <p:txBody>
+          <a:bodyPr/>
+          <a:lstStyle/>
+          <a:p>
+            <a:endParaRPr lang="en-US"/>
+          </a:p>
+        </p:txBody>
+      </p:sp>
+      <p:sp>
+        <p:nvSpPr>
+          <p:cNvPr id="4" name="Header Placeholder 3"/>
+          <p:cNvSpPr>
+            <a:spLocks noGrp="1"/>
+          </p:cNvSpPr>
+          <p:nvPr>
+            <p:ph type="hdr" sz="quarter"/>
+          </p:nvPr>
+        </p:nvSpPr>
+        <p:spPr/>
+        <p:txBody>
+          <a:bodyPr/>
+          <a:lstStyle/>
+          <a:p>
+            <a:endParaRPr lang="en-US"/>
+          </a:p>
+        </p:txBody>
+      </p:sp>
+      <p:sp>
+        <p:nvSpPr>
+          <p:cNvPr id="5" name="Footer Placeholder 4"/>
+          <p:cNvSpPr>
+            <a:spLocks noGrp="1"/>
+          </p:cNvSpPr>
+          <p:nvPr>
+            <p:ph type="ftr" sz="quarter" idx="4"/>
+          </p:nvPr>
+        </p:nvSpPr>
+        <p:spPr/>
+        <p:txBody>
+          <a:bodyPr/>
+          <a:lstStyle/>
+          <a:p>
+            <a:endParaRPr lang="en-US"/>
+          </a:p>
+        </p:txBody>
+      </p:sp>
+      <p:sp>
+        <p:nvSpPr>
+          <p:cNvPr id="6" name="Slide Number Placeholder 5"/>
+          <p:cNvSpPr>
+            <a:spLocks noGrp="1"/>
+          </p:cNvSpPr>
+          <p:nvPr>
+            <p:ph type="sldNum" sz="quarter" idx="5"/>
+          </p:nvPr>
+        </p:nvSpPr>
+        <p:spPr/>
+        <p:txBody>
+          <a:bodyPr/>
+          <a:lstStyle/>
+          <a:p>
+            <a:fld id="{FC1513FD-C785-4211-B2B0-BF864DB9E391}" type="slidenum">
+              <a:rPr lang="en-US" smtClean="0"/>
+              <a:t>12</a:t>
             </a:fld>
             <a:endParaRPr lang="en-US"/>
           </a:p>
@@ -1149,7 +1272,7 @@
     </p:spTree>
     <p:extLst>
       <p:ext uri="{BB962C8B-B14F-4D97-AF65-F5344CB8AC3E}">
-        <p14:creationId xmlns:p14="http://schemas.microsoft.com/office/powerpoint/2010/main" val="476866706"/>
+        <p14:creationId xmlns:p14="http://schemas.microsoft.com/office/powerpoint/2010/main" val="2007960236"/>
       </p:ext>
     </p:extLst>
   </p:cSld>
@@ -1271,7 +1394,7 @@
     </p:spTree>
     <p:extLst>
       <p:ext uri="{BB962C8B-B14F-4D97-AF65-F5344CB8AC3E}">
-        <p14:creationId xmlns:p14="http://schemas.microsoft.com/office/powerpoint/2010/main" val="2962446545"/>
+        <p14:creationId xmlns:p14="http://schemas.microsoft.com/office/powerpoint/2010/main" val="476866706"/>
       </p:ext>
     </p:extLst>
   </p:cSld>
@@ -1393,7 +1516,7 @@
     </p:spTree>
     <p:extLst>
       <p:ext uri="{BB962C8B-B14F-4D97-AF65-F5344CB8AC3E}">
-        <p14:creationId xmlns:p14="http://schemas.microsoft.com/office/powerpoint/2010/main" val="1692428442"/>
+        <p14:creationId xmlns:p14="http://schemas.microsoft.com/office/powerpoint/2010/main" val="2962446545"/>
       </p:ext>
     </p:extLst>
   </p:cSld>
@@ -1515,7 +1638,7 @@
     </p:spTree>
     <p:extLst>
       <p:ext uri="{BB962C8B-B14F-4D97-AF65-F5344CB8AC3E}">
-        <p14:creationId xmlns:p14="http://schemas.microsoft.com/office/powerpoint/2010/main" val="713017731"/>
+        <p14:creationId xmlns:p14="http://schemas.microsoft.com/office/powerpoint/2010/main" val="1692428442"/>
       </p:ext>
     </p:extLst>
   </p:cSld>
@@ -1637,7 +1760,7 @@
     </p:spTree>
     <p:extLst>
       <p:ext uri="{BB962C8B-B14F-4D97-AF65-F5344CB8AC3E}">
-        <p14:creationId xmlns:p14="http://schemas.microsoft.com/office/powerpoint/2010/main" val="1147223370"/>
+        <p14:creationId xmlns:p14="http://schemas.microsoft.com/office/powerpoint/2010/main" val="713017731"/>
       </p:ext>
     </p:extLst>
   </p:cSld>
@@ -1759,7 +1882,7 @@
     </p:spTree>
     <p:extLst>
       <p:ext uri="{BB962C8B-B14F-4D97-AF65-F5344CB8AC3E}">
-        <p14:creationId xmlns:p14="http://schemas.microsoft.com/office/powerpoint/2010/main" val="877862846"/>
+        <p14:creationId xmlns:p14="http://schemas.microsoft.com/office/powerpoint/2010/main" val="1147223370"/>
       </p:ext>
     </p:extLst>
   </p:cSld>
@@ -1881,7 +2004,7 @@
     </p:spTree>
     <p:extLst>
       <p:ext uri="{BB962C8B-B14F-4D97-AF65-F5344CB8AC3E}">
-        <p14:creationId xmlns:p14="http://schemas.microsoft.com/office/powerpoint/2010/main" val="418226113"/>
+        <p14:creationId xmlns:p14="http://schemas.microsoft.com/office/powerpoint/2010/main" val="877862846"/>
       </p:ext>
     </p:extLst>
   </p:cSld>
@@ -2003,7 +2126,7 @@
     </p:spTree>
     <p:extLst>
       <p:ext uri="{BB962C8B-B14F-4D97-AF65-F5344CB8AC3E}">
-        <p14:creationId xmlns:p14="http://schemas.microsoft.com/office/powerpoint/2010/main" val="2883995183"/>
+        <p14:creationId xmlns:p14="http://schemas.microsoft.com/office/powerpoint/2010/main" val="418226113"/>
       </p:ext>
     </p:extLst>
   </p:cSld>
@@ -2160,7 +2283,7 @@
           <a:p>
             <a:fld id="{A42A12F9-EA54-49E1-A3FD-186D9B25B348}" type="datetimeFigureOut">
               <a:rPr lang="pl-PL" smtClean="0"/>
-              <a:t>15.09.2019</a:t>
+              <a:t>06.10.2019</a:t>
             </a:fld>
             <a:endParaRPr lang="pl-PL"/>
           </a:p>
@@ -2358,7 +2481,7 @@
           <a:p>
             <a:fld id="{A42A12F9-EA54-49E1-A3FD-186D9B25B348}" type="datetimeFigureOut">
               <a:rPr lang="pl-PL" smtClean="0"/>
-              <a:t>15.09.2019</a:t>
+              <a:t>06.10.2019</a:t>
             </a:fld>
             <a:endParaRPr lang="pl-PL"/>
           </a:p>
@@ -2566,7 +2689,7 @@
           <a:p>
             <a:fld id="{A42A12F9-EA54-49E1-A3FD-186D9B25B348}" type="datetimeFigureOut">
               <a:rPr lang="pl-PL" smtClean="0"/>
-              <a:t>15.09.2019</a:t>
+              <a:t>06.10.2019</a:t>
             </a:fld>
             <a:endParaRPr lang="pl-PL"/>
           </a:p>
@@ -2764,7 +2887,7 @@
           <a:p>
             <a:fld id="{A42A12F9-EA54-49E1-A3FD-186D9B25B348}" type="datetimeFigureOut">
               <a:rPr lang="pl-PL" smtClean="0"/>
-              <a:t>15.09.2019</a:t>
+              <a:t>06.10.2019</a:t>
             </a:fld>
             <a:endParaRPr lang="pl-PL"/>
           </a:p>
@@ -3039,7 +3162,7 @@
           <a:p>
             <a:fld id="{A42A12F9-EA54-49E1-A3FD-186D9B25B348}" type="datetimeFigureOut">
               <a:rPr lang="pl-PL" smtClean="0"/>
-              <a:t>15.09.2019</a:t>
+              <a:t>06.10.2019</a:t>
             </a:fld>
             <a:endParaRPr lang="pl-PL"/>
           </a:p>
@@ -3304,7 +3427,7 @@
           <a:p>
             <a:fld id="{A42A12F9-EA54-49E1-A3FD-186D9B25B348}" type="datetimeFigureOut">
               <a:rPr lang="pl-PL" smtClean="0"/>
-              <a:t>15.09.2019</a:t>
+              <a:t>06.10.2019</a:t>
             </a:fld>
             <a:endParaRPr lang="pl-PL"/>
           </a:p>
@@ -3716,7 +3839,7 @@
           <a:p>
             <a:fld id="{A42A12F9-EA54-49E1-A3FD-186D9B25B348}" type="datetimeFigureOut">
               <a:rPr lang="pl-PL" smtClean="0"/>
-              <a:t>15.09.2019</a:t>
+              <a:t>06.10.2019</a:t>
             </a:fld>
             <a:endParaRPr lang="pl-PL"/>
           </a:p>
@@ -3857,7 +3980,7 @@
           <a:p>
             <a:fld id="{A42A12F9-EA54-49E1-A3FD-186D9B25B348}" type="datetimeFigureOut">
               <a:rPr lang="pl-PL" smtClean="0"/>
-              <a:t>15.09.2019</a:t>
+              <a:t>06.10.2019</a:t>
             </a:fld>
             <a:endParaRPr lang="pl-PL"/>
           </a:p>
@@ -3970,7 +4093,7 @@
           <a:p>
             <a:fld id="{A42A12F9-EA54-49E1-A3FD-186D9B25B348}" type="datetimeFigureOut">
               <a:rPr lang="pl-PL" smtClean="0"/>
-              <a:t>15.09.2019</a:t>
+              <a:t>06.10.2019</a:t>
             </a:fld>
             <a:endParaRPr lang="pl-PL"/>
           </a:p>
@@ -4281,7 +4404,7 @@
           <a:p>
             <a:fld id="{A42A12F9-EA54-49E1-A3FD-186D9B25B348}" type="datetimeFigureOut">
               <a:rPr lang="pl-PL" smtClean="0"/>
-              <a:t>15.09.2019</a:t>
+              <a:t>06.10.2019</a:t>
             </a:fld>
             <a:endParaRPr lang="pl-PL"/>
           </a:p>
@@ -4569,7 +4692,7 @@
           <a:p>
             <a:fld id="{A42A12F9-EA54-49E1-A3FD-186D9B25B348}" type="datetimeFigureOut">
               <a:rPr lang="pl-PL" smtClean="0"/>
-              <a:t>15.09.2019</a:t>
+              <a:t>06.10.2019</a:t>
             </a:fld>
             <a:endParaRPr lang="pl-PL"/>
           </a:p>
@@ -4810,7 +4933,7 @@
           <a:p>
             <a:fld id="{A42A12F9-EA54-49E1-A3FD-186D9B25B348}" type="datetimeFigureOut">
               <a:rPr lang="pl-PL" smtClean="0"/>
-              <a:t>15.09.2019</a:t>
+              <a:t>06.10.2019</a:t>
             </a:fld>
             <a:endParaRPr lang="pl-PL"/>
           </a:p>
@@ -5293,6 +5416,759 @@
 </file>
 
 <file path=ppt/slides/slide10.xml><?xml version="1.0" encoding="utf-8"?>
+<p:sld xmlns:a="http://schemas.openxmlformats.org/drawingml/2006/main" xmlns:r="http://schemas.openxmlformats.org/officeDocument/2006/relationships" xmlns:p="http://schemas.openxmlformats.org/presentationml/2006/main">
+  <p:cSld>
+    <p:bg>
+      <p:bgPr>
+        <a:gradFill>
+          <a:gsLst>
+            <a:gs pos="54000">
+              <a:srgbClr val="07A1D7"/>
+            </a:gs>
+            <a:gs pos="100000">
+              <a:srgbClr val="11CFD9"/>
+            </a:gs>
+          </a:gsLst>
+          <a:lin ang="5400000" scaled="1"/>
+        </a:gradFill>
+        <a:effectLst/>
+      </p:bgPr>
+    </p:bg>
+    <p:spTree>
+      <p:nvGrpSpPr>
+        <p:cNvPr id="1" name=""/>
+        <p:cNvGrpSpPr/>
+        <p:nvPr/>
+      </p:nvGrpSpPr>
+      <p:grpSpPr>
+        <a:xfrm>
+          <a:off x="0" y="0"/>
+          <a:ext cx="0" cy="0"/>
+          <a:chOff x="0" y="0"/>
+          <a:chExt cx="0" cy="0"/>
+        </a:xfrm>
+      </p:grpSpPr>
+      <p:pic>
+        <p:nvPicPr>
+          <p:cNvPr id="5" name="Obraz 4">
+            <a:extLst>
+              <a:ext uri="{FF2B5EF4-FFF2-40B4-BE49-F238E27FC236}">
+                <a16:creationId xmlns:a16="http://schemas.microsoft.com/office/drawing/2014/main" id="{FA2B5562-A690-428E-8278-450D1EECD2E4}"/>
+              </a:ext>
+            </a:extLst>
+          </p:cNvPr>
+          <p:cNvPicPr>
+            <a:picLocks noChangeAspect="1"/>
+          </p:cNvPicPr>
+          <p:nvPr/>
+        </p:nvPicPr>
+        <p:blipFill>
+          <a:blip r:embed="rId3">
+            <a:extLst>
+              <a:ext uri="{28A0092B-C50C-407E-A947-70E740481C1C}">
+                <a14:useLocalDpi xmlns:a14="http://schemas.microsoft.com/office/drawing/2010/main" val="0"/>
+              </a:ext>
+            </a:extLst>
+          </a:blip>
+          <a:stretch>
+            <a:fillRect/>
+          </a:stretch>
+        </p:blipFill>
+        <p:spPr>
+          <a:xfrm>
+            <a:off x="153944" y="139485"/>
+            <a:ext cx="2471463" cy="1425844"/>
+          </a:xfrm>
+          <a:prstGeom prst="rect">
+            <a:avLst/>
+          </a:prstGeom>
+        </p:spPr>
+      </p:pic>
+      <p:pic>
+        <p:nvPicPr>
+          <p:cNvPr id="10" name="Grafika 9" descr="Uścisk dłoni">
+            <a:extLst>
+              <a:ext uri="{FF2B5EF4-FFF2-40B4-BE49-F238E27FC236}">
+                <a16:creationId xmlns:a16="http://schemas.microsoft.com/office/drawing/2014/main" id="{43E8A39C-E342-4A1A-895D-358E46B367B1}"/>
+              </a:ext>
+            </a:extLst>
+          </p:cNvPr>
+          <p:cNvPicPr>
+            <a:picLocks noChangeAspect="1"/>
+          </p:cNvPicPr>
+          <p:nvPr/>
+        </p:nvPicPr>
+        <p:blipFill>
+          <a:blip r:embed="rId4">
+            <a:extLst>
+              <a:ext uri="{28A0092B-C50C-407E-A947-70E740481C1C}">
+                <a14:useLocalDpi xmlns:a14="http://schemas.microsoft.com/office/drawing/2010/main" val="0"/>
+              </a:ext>
+              <a:ext uri="{96DAC541-7B7A-43D3-8B79-37D633B846F1}">
+                <asvg:svgBlip xmlns:asvg="http://schemas.microsoft.com/office/drawing/2016/SVG/main" r:embed="rId5"/>
+              </a:ext>
+            </a:extLst>
+          </a:blip>
+          <a:stretch>
+            <a:fillRect/>
+          </a:stretch>
+        </p:blipFill>
+        <p:spPr>
+          <a:xfrm>
+            <a:off x="3805085" y="700299"/>
+            <a:ext cx="5134070" cy="5134070"/>
+          </a:xfrm>
+          <a:prstGeom prst="rect">
+            <a:avLst/>
+          </a:prstGeom>
+        </p:spPr>
+      </p:pic>
+      <p:grpSp>
+        <p:nvGrpSpPr>
+          <p:cNvPr id="16" name="Grupa 15">
+            <a:extLst>
+              <a:ext uri="{FF2B5EF4-FFF2-40B4-BE49-F238E27FC236}">
+                <a16:creationId xmlns:a16="http://schemas.microsoft.com/office/drawing/2014/main" id="{B79AE4CA-E867-44F2-9070-7D48A6C6EBD5}"/>
+              </a:ext>
+            </a:extLst>
+          </p:cNvPr>
+          <p:cNvGrpSpPr/>
+          <p:nvPr/>
+        </p:nvGrpSpPr>
+        <p:grpSpPr>
+          <a:xfrm>
+            <a:off x="8959242" y="3070653"/>
+            <a:ext cx="2941986" cy="2240648"/>
+            <a:chOff x="9315357" y="2584728"/>
+            <a:chExt cx="2941986" cy="2240648"/>
+          </a:xfrm>
+        </p:grpSpPr>
+        <p:pic>
+          <p:nvPicPr>
+            <p:cNvPr id="12" name="Grafika 11" descr="Pracownik biurowy">
+              <a:extLst>
+                <a:ext uri="{FF2B5EF4-FFF2-40B4-BE49-F238E27FC236}">
+                  <a16:creationId xmlns:a16="http://schemas.microsoft.com/office/drawing/2014/main" id="{7FF245DF-6704-4B7A-A1D6-62E8C4A789AF}"/>
+                </a:ext>
+              </a:extLst>
+            </p:cNvPr>
+            <p:cNvPicPr>
+              <a:picLocks noChangeAspect="1"/>
+            </p:cNvPicPr>
+            <p:nvPr/>
+          </p:nvPicPr>
+          <p:blipFill>
+            <a:blip r:embed="rId6">
+              <a:extLst>
+                <a:ext uri="{28A0092B-C50C-407E-A947-70E740481C1C}">
+                  <a14:useLocalDpi xmlns:a14="http://schemas.microsoft.com/office/drawing/2010/main" val="0"/>
+                </a:ext>
+                <a:ext uri="{96DAC541-7B7A-43D3-8B79-37D633B846F1}">
+                  <asvg:svgBlip xmlns:asvg="http://schemas.microsoft.com/office/drawing/2016/SVG/main" r:embed="rId7"/>
+                </a:ext>
+              </a:extLst>
+            </a:blip>
+            <a:stretch>
+              <a:fillRect/>
+            </a:stretch>
+          </p:blipFill>
+          <p:spPr>
+            <a:xfrm>
+              <a:off x="9315357" y="2584728"/>
+              <a:ext cx="1365212" cy="1365212"/>
+            </a:xfrm>
+            <a:prstGeom prst="rect">
+              <a:avLst/>
+            </a:prstGeom>
+          </p:spPr>
+        </p:pic>
+        <p:pic>
+          <p:nvPicPr>
+            <p:cNvPr id="13" name="Grafika 12" descr="Pracownik biurowy">
+              <a:extLst>
+                <a:ext uri="{FF2B5EF4-FFF2-40B4-BE49-F238E27FC236}">
+                  <a16:creationId xmlns:a16="http://schemas.microsoft.com/office/drawing/2014/main" id="{71A47239-6F38-4D6B-A727-D45C3DEB557E}"/>
+                </a:ext>
+              </a:extLst>
+            </p:cNvPr>
+            <p:cNvPicPr>
+              <a:picLocks noChangeAspect="1"/>
+            </p:cNvPicPr>
+            <p:nvPr/>
+          </p:nvPicPr>
+          <p:blipFill>
+            <a:blip r:embed="rId6">
+              <a:extLst>
+                <a:ext uri="{28A0092B-C50C-407E-A947-70E740481C1C}">
+                  <a14:useLocalDpi xmlns:a14="http://schemas.microsoft.com/office/drawing/2010/main" val="0"/>
+                </a:ext>
+                <a:ext uri="{96DAC541-7B7A-43D3-8B79-37D633B846F1}">
+                  <asvg:svgBlip xmlns:asvg="http://schemas.microsoft.com/office/drawing/2016/SVG/main" r:embed="rId7"/>
+                </a:ext>
+              </a:extLst>
+            </a:blip>
+            <a:stretch>
+              <a:fillRect/>
+            </a:stretch>
+          </p:blipFill>
+          <p:spPr>
+            <a:xfrm>
+              <a:off x="10103744" y="3460164"/>
+              <a:ext cx="1365212" cy="1365212"/>
+            </a:xfrm>
+            <a:prstGeom prst="rect">
+              <a:avLst/>
+            </a:prstGeom>
+          </p:spPr>
+        </p:pic>
+        <p:pic>
+          <p:nvPicPr>
+            <p:cNvPr id="14" name="Grafika 13" descr="Pracownik biurowy">
+              <a:extLst>
+                <a:ext uri="{FF2B5EF4-FFF2-40B4-BE49-F238E27FC236}">
+                  <a16:creationId xmlns:a16="http://schemas.microsoft.com/office/drawing/2014/main" id="{803158BE-5E55-4CE5-996A-DE4F5A66B730}"/>
+                </a:ext>
+              </a:extLst>
+            </p:cNvPr>
+            <p:cNvPicPr>
+              <a:picLocks noChangeAspect="1"/>
+            </p:cNvPicPr>
+            <p:nvPr/>
+          </p:nvPicPr>
+          <p:blipFill>
+            <a:blip r:embed="rId6">
+              <a:extLst>
+                <a:ext uri="{28A0092B-C50C-407E-A947-70E740481C1C}">
+                  <a14:useLocalDpi xmlns:a14="http://schemas.microsoft.com/office/drawing/2010/main" val="0"/>
+                </a:ext>
+                <a:ext uri="{96DAC541-7B7A-43D3-8B79-37D633B846F1}">
+                  <asvg:svgBlip xmlns:asvg="http://schemas.microsoft.com/office/drawing/2016/SVG/main" r:embed="rId7"/>
+                </a:ext>
+              </a:extLst>
+            </a:blip>
+            <a:stretch>
+              <a:fillRect/>
+            </a:stretch>
+          </p:blipFill>
+          <p:spPr>
+            <a:xfrm>
+              <a:off x="10892131" y="2900955"/>
+              <a:ext cx="1365212" cy="1365212"/>
+            </a:xfrm>
+            <a:prstGeom prst="rect">
+              <a:avLst/>
+            </a:prstGeom>
+          </p:spPr>
+        </p:pic>
+      </p:grpSp>
+      <p:grpSp>
+        <p:nvGrpSpPr>
+          <p:cNvPr id="17" name="Grupa 16">
+            <a:extLst>
+              <a:ext uri="{FF2B5EF4-FFF2-40B4-BE49-F238E27FC236}">
+                <a16:creationId xmlns:a16="http://schemas.microsoft.com/office/drawing/2014/main" id="{5375CA3A-B624-48D7-A463-FCC3F236962B}"/>
+              </a:ext>
+            </a:extLst>
+          </p:cNvPr>
+          <p:cNvGrpSpPr/>
+          <p:nvPr/>
+        </p:nvGrpSpPr>
+        <p:grpSpPr>
+          <a:xfrm>
+            <a:off x="8853461" y="3027838"/>
+            <a:ext cx="2941986" cy="2240648"/>
+            <a:chOff x="9315357" y="2584728"/>
+            <a:chExt cx="2941986" cy="2240648"/>
+          </a:xfrm>
+          <a:solidFill>
+            <a:schemeClr val="bg1"/>
+          </a:solidFill>
+        </p:grpSpPr>
+        <p:pic>
+          <p:nvPicPr>
+            <p:cNvPr id="18" name="Grafika 17" descr="Pracownik biurowy">
+              <a:extLst>
+                <a:ext uri="{FF2B5EF4-FFF2-40B4-BE49-F238E27FC236}">
+                  <a16:creationId xmlns:a16="http://schemas.microsoft.com/office/drawing/2014/main" id="{62D6BFC0-61ED-460A-952A-5366CA02274B}"/>
+                </a:ext>
+              </a:extLst>
+            </p:cNvPr>
+            <p:cNvPicPr>
+              <a:picLocks noChangeAspect="1"/>
+            </p:cNvPicPr>
+            <p:nvPr/>
+          </p:nvPicPr>
+          <p:blipFill>
+            <a:blip r:embed="rId8">
+              <a:extLst>
+                <a:ext uri="{28A0092B-C50C-407E-A947-70E740481C1C}">
+                  <a14:useLocalDpi xmlns:a14="http://schemas.microsoft.com/office/drawing/2010/main" val="0"/>
+                </a:ext>
+                <a:ext uri="{96DAC541-7B7A-43D3-8B79-37D633B846F1}">
+                  <asvg:svgBlip xmlns:asvg="http://schemas.microsoft.com/office/drawing/2016/SVG/main" r:embed="rId9"/>
+                </a:ext>
+              </a:extLst>
+            </a:blip>
+            <a:stretch>
+              <a:fillRect/>
+            </a:stretch>
+          </p:blipFill>
+          <p:spPr>
+            <a:xfrm>
+              <a:off x="9315357" y="2584728"/>
+              <a:ext cx="1365212" cy="1365212"/>
+            </a:xfrm>
+            <a:prstGeom prst="rect">
+              <a:avLst/>
+            </a:prstGeom>
+          </p:spPr>
+        </p:pic>
+        <p:pic>
+          <p:nvPicPr>
+            <p:cNvPr id="19" name="Grafika 18" descr="Pracownik biurowy">
+              <a:extLst>
+                <a:ext uri="{FF2B5EF4-FFF2-40B4-BE49-F238E27FC236}">
+                  <a16:creationId xmlns:a16="http://schemas.microsoft.com/office/drawing/2014/main" id="{F319ECBD-05AD-4FF7-AAF2-00C5983D90FE}"/>
+                </a:ext>
+              </a:extLst>
+            </p:cNvPr>
+            <p:cNvPicPr>
+              <a:picLocks noChangeAspect="1"/>
+            </p:cNvPicPr>
+            <p:nvPr/>
+          </p:nvPicPr>
+          <p:blipFill>
+            <a:blip r:embed="rId8">
+              <a:extLst>
+                <a:ext uri="{28A0092B-C50C-407E-A947-70E740481C1C}">
+                  <a14:useLocalDpi xmlns:a14="http://schemas.microsoft.com/office/drawing/2010/main" val="0"/>
+                </a:ext>
+                <a:ext uri="{96DAC541-7B7A-43D3-8B79-37D633B846F1}">
+                  <asvg:svgBlip xmlns:asvg="http://schemas.microsoft.com/office/drawing/2016/SVG/main" r:embed="rId9"/>
+                </a:ext>
+              </a:extLst>
+            </a:blip>
+            <a:stretch>
+              <a:fillRect/>
+            </a:stretch>
+          </p:blipFill>
+          <p:spPr>
+            <a:xfrm>
+              <a:off x="10103744" y="3460164"/>
+              <a:ext cx="1365212" cy="1365212"/>
+            </a:xfrm>
+            <a:prstGeom prst="rect">
+              <a:avLst/>
+            </a:prstGeom>
+          </p:spPr>
+        </p:pic>
+        <p:pic>
+          <p:nvPicPr>
+            <p:cNvPr id="20" name="Grafika 19" descr="Pracownik biurowy">
+              <a:extLst>
+                <a:ext uri="{FF2B5EF4-FFF2-40B4-BE49-F238E27FC236}">
+                  <a16:creationId xmlns:a16="http://schemas.microsoft.com/office/drawing/2014/main" id="{07285869-8BDD-4DD3-9A06-21DE9ACE8EBF}"/>
+                </a:ext>
+              </a:extLst>
+            </p:cNvPr>
+            <p:cNvPicPr>
+              <a:picLocks noChangeAspect="1"/>
+            </p:cNvPicPr>
+            <p:nvPr/>
+          </p:nvPicPr>
+          <p:blipFill>
+            <a:blip r:embed="rId8">
+              <a:extLst>
+                <a:ext uri="{28A0092B-C50C-407E-A947-70E740481C1C}">
+                  <a14:useLocalDpi xmlns:a14="http://schemas.microsoft.com/office/drawing/2010/main" val="0"/>
+                </a:ext>
+                <a:ext uri="{96DAC541-7B7A-43D3-8B79-37D633B846F1}">
+                  <asvg:svgBlip xmlns:asvg="http://schemas.microsoft.com/office/drawing/2016/SVG/main" r:embed="rId9"/>
+                </a:ext>
+              </a:extLst>
+            </a:blip>
+            <a:stretch>
+              <a:fillRect/>
+            </a:stretch>
+          </p:blipFill>
+          <p:spPr>
+            <a:xfrm>
+              <a:off x="10892131" y="2900955"/>
+              <a:ext cx="1365212" cy="1365212"/>
+            </a:xfrm>
+            <a:prstGeom prst="rect">
+              <a:avLst/>
+            </a:prstGeom>
+          </p:spPr>
+        </p:pic>
+      </p:grpSp>
+      <p:pic>
+        <p:nvPicPr>
+          <p:cNvPr id="21" name="Grafika 20" descr="Uścisk dłoni">
+            <a:extLst>
+              <a:ext uri="{FF2B5EF4-FFF2-40B4-BE49-F238E27FC236}">
+                <a16:creationId xmlns:a16="http://schemas.microsoft.com/office/drawing/2014/main" id="{8F69160B-4308-4826-94D4-890480B82D1B}"/>
+              </a:ext>
+            </a:extLst>
+          </p:cNvPr>
+          <p:cNvPicPr>
+            <a:picLocks noChangeAspect="1"/>
+          </p:cNvPicPr>
+          <p:nvPr/>
+        </p:nvPicPr>
+        <p:blipFill>
+          <a:blip r:embed="rId10">
+            <a:extLst>
+              <a:ext uri="{28A0092B-C50C-407E-A947-70E740481C1C}">
+                <a14:useLocalDpi xmlns:a14="http://schemas.microsoft.com/office/drawing/2010/main" val="0"/>
+              </a:ext>
+              <a:ext uri="{96DAC541-7B7A-43D3-8B79-37D633B846F1}">
+                <asvg:svgBlip xmlns:asvg="http://schemas.microsoft.com/office/drawing/2016/SVG/main" r:embed="rId11"/>
+              </a:ext>
+            </a:extLst>
+          </a:blip>
+          <a:stretch>
+            <a:fillRect/>
+          </a:stretch>
+        </p:blipFill>
+        <p:spPr>
+          <a:xfrm>
+            <a:off x="3784998" y="600908"/>
+            <a:ext cx="5134070" cy="5134070"/>
+          </a:xfrm>
+          <a:prstGeom prst="rect">
+            <a:avLst/>
+          </a:prstGeom>
+        </p:spPr>
+      </p:pic>
+      <p:grpSp>
+        <p:nvGrpSpPr>
+          <p:cNvPr id="2" name="Grupa 1">
+            <a:extLst>
+              <a:ext uri="{FF2B5EF4-FFF2-40B4-BE49-F238E27FC236}">
+                <a16:creationId xmlns:a16="http://schemas.microsoft.com/office/drawing/2014/main" id="{5A81BD43-8992-411B-B989-8BEA45E77262}"/>
+              </a:ext>
+            </a:extLst>
+          </p:cNvPr>
+          <p:cNvGrpSpPr/>
+          <p:nvPr/>
+        </p:nvGrpSpPr>
+        <p:grpSpPr>
+          <a:xfrm>
+            <a:off x="861707" y="2858139"/>
+            <a:ext cx="2523997" cy="2453162"/>
+            <a:chOff x="861707" y="2858139"/>
+            <a:chExt cx="2523997" cy="2453162"/>
+          </a:xfrm>
+        </p:grpSpPr>
+        <p:grpSp>
+          <p:nvGrpSpPr>
+            <p:cNvPr id="15" name="Grupa 14">
+              <a:extLst>
+                <a:ext uri="{FF2B5EF4-FFF2-40B4-BE49-F238E27FC236}">
+                  <a16:creationId xmlns:a16="http://schemas.microsoft.com/office/drawing/2014/main" id="{E6368EE1-4515-432C-8043-AAA31E47CD19}"/>
+                </a:ext>
+              </a:extLst>
+            </p:cNvPr>
+            <p:cNvGrpSpPr/>
+            <p:nvPr/>
+          </p:nvGrpSpPr>
+          <p:grpSpPr>
+            <a:xfrm>
+              <a:off x="882424" y="2974238"/>
+              <a:ext cx="2503280" cy="2337063"/>
+              <a:chOff x="901148" y="2166492"/>
+              <a:chExt cx="2503280" cy="2337063"/>
+            </a:xfrm>
+          </p:grpSpPr>
+          <p:pic>
+            <p:nvPicPr>
+              <p:cNvPr id="3" name="Grafika 2" descr="Koła zębate">
+                <a:extLst>
+                  <a:ext uri="{FF2B5EF4-FFF2-40B4-BE49-F238E27FC236}">
+                    <a16:creationId xmlns:a16="http://schemas.microsoft.com/office/drawing/2014/main" id="{94B09A1F-458C-46E9-B416-502D546E35C4}"/>
+                  </a:ext>
+                </a:extLst>
+              </p:cNvPr>
+              <p:cNvPicPr>
+                <a:picLocks noChangeAspect="1"/>
+              </p:cNvPicPr>
+              <p:nvPr/>
+            </p:nvPicPr>
+            <p:blipFill>
+              <a:blip r:embed="rId12">
+                <a:extLst>
+                  <a:ext uri="{28A0092B-C50C-407E-A947-70E740481C1C}">
+                    <a14:useLocalDpi xmlns:a14="http://schemas.microsoft.com/office/drawing/2010/main" val="0"/>
+                  </a:ext>
+                  <a:ext uri="{96DAC541-7B7A-43D3-8B79-37D633B846F1}">
+                    <asvg:svgBlip xmlns:asvg="http://schemas.microsoft.com/office/drawing/2016/SVG/main" r:embed="rId13"/>
+                  </a:ext>
+                </a:extLst>
+              </a:blip>
+              <a:stretch>
+                <a:fillRect/>
+              </a:stretch>
+            </p:blipFill>
+            <p:spPr>
+              <a:xfrm>
+                <a:off x="1846386" y="2945513"/>
+                <a:ext cx="1558042" cy="1558042"/>
+              </a:xfrm>
+              <a:prstGeom prst="rect">
+                <a:avLst/>
+              </a:prstGeom>
+            </p:spPr>
+          </p:pic>
+          <p:pic>
+            <p:nvPicPr>
+              <p:cNvPr id="6" name="Grafika 5" descr="Pojedyncze koło zębate">
+                <a:extLst>
+                  <a:ext uri="{FF2B5EF4-FFF2-40B4-BE49-F238E27FC236}">
+                    <a16:creationId xmlns:a16="http://schemas.microsoft.com/office/drawing/2014/main" id="{C5809225-676D-43FD-ACA7-F35351E42C82}"/>
+                  </a:ext>
+                </a:extLst>
+              </p:cNvPr>
+              <p:cNvPicPr>
+                <a:picLocks noChangeAspect="1"/>
+              </p:cNvPicPr>
+              <p:nvPr/>
+            </p:nvPicPr>
+            <p:blipFill>
+              <a:blip r:embed="rId14">
+                <a:extLst>
+                  <a:ext uri="{28A0092B-C50C-407E-A947-70E740481C1C}">
+                    <a14:useLocalDpi xmlns:a14="http://schemas.microsoft.com/office/drawing/2010/main" val="0"/>
+                  </a:ext>
+                  <a:ext uri="{96DAC541-7B7A-43D3-8B79-37D633B846F1}">
+                    <asvg:svgBlip xmlns:asvg="http://schemas.microsoft.com/office/drawing/2016/SVG/main" r:embed="rId15"/>
+                  </a:ext>
+                </a:extLst>
+              </a:blip>
+              <a:stretch>
+                <a:fillRect/>
+              </a:stretch>
+            </p:blipFill>
+            <p:spPr>
+              <a:xfrm>
+                <a:off x="901148" y="2166492"/>
+                <a:ext cx="1558042" cy="1558042"/>
+              </a:xfrm>
+              <a:prstGeom prst="rect">
+                <a:avLst/>
+              </a:prstGeom>
+            </p:spPr>
+          </p:pic>
+        </p:grpSp>
+        <p:grpSp>
+          <p:nvGrpSpPr>
+            <p:cNvPr id="22" name="Grupa 21">
+              <a:extLst>
+                <a:ext uri="{FF2B5EF4-FFF2-40B4-BE49-F238E27FC236}">
+                  <a16:creationId xmlns:a16="http://schemas.microsoft.com/office/drawing/2014/main" id="{1FA60A96-DD3B-4249-A8FD-06889D1000F7}"/>
+                </a:ext>
+              </a:extLst>
+            </p:cNvPr>
+            <p:cNvGrpSpPr/>
+            <p:nvPr/>
+          </p:nvGrpSpPr>
+          <p:grpSpPr>
+            <a:xfrm>
+              <a:off x="861707" y="2858139"/>
+              <a:ext cx="2503280" cy="2337063"/>
+              <a:chOff x="901148" y="2166492"/>
+              <a:chExt cx="2503280" cy="2337063"/>
+            </a:xfrm>
+            <a:solidFill>
+              <a:schemeClr val="bg1"/>
+            </a:solidFill>
+          </p:grpSpPr>
+          <p:pic>
+            <p:nvPicPr>
+              <p:cNvPr id="23" name="Grafika 22" descr="Koła zębate">
+                <a:extLst>
+                  <a:ext uri="{FF2B5EF4-FFF2-40B4-BE49-F238E27FC236}">
+                    <a16:creationId xmlns:a16="http://schemas.microsoft.com/office/drawing/2014/main" id="{F7D551CB-0B57-4934-9549-B11C5DFA865F}"/>
+                  </a:ext>
+                </a:extLst>
+              </p:cNvPr>
+              <p:cNvPicPr>
+                <a:picLocks noChangeAspect="1"/>
+              </p:cNvPicPr>
+              <p:nvPr/>
+            </p:nvPicPr>
+            <p:blipFill>
+              <a:blip r:embed="rId16">
+                <a:extLst>
+                  <a:ext uri="{28A0092B-C50C-407E-A947-70E740481C1C}">
+                    <a14:useLocalDpi xmlns:a14="http://schemas.microsoft.com/office/drawing/2010/main" val="0"/>
+                  </a:ext>
+                  <a:ext uri="{96DAC541-7B7A-43D3-8B79-37D633B846F1}">
+                    <asvg:svgBlip xmlns:asvg="http://schemas.microsoft.com/office/drawing/2016/SVG/main" r:embed="rId17"/>
+                  </a:ext>
+                </a:extLst>
+              </a:blip>
+              <a:stretch>
+                <a:fillRect/>
+              </a:stretch>
+            </p:blipFill>
+            <p:spPr>
+              <a:xfrm>
+                <a:off x="1846386" y="2945513"/>
+                <a:ext cx="1558042" cy="1558042"/>
+              </a:xfrm>
+              <a:prstGeom prst="rect">
+                <a:avLst/>
+              </a:prstGeom>
+            </p:spPr>
+          </p:pic>
+          <p:pic>
+            <p:nvPicPr>
+              <p:cNvPr id="24" name="Grafika 23" descr="Pojedyncze koło zębate">
+                <a:extLst>
+                  <a:ext uri="{FF2B5EF4-FFF2-40B4-BE49-F238E27FC236}">
+                    <a16:creationId xmlns:a16="http://schemas.microsoft.com/office/drawing/2014/main" id="{5AB7828F-3C3D-4C2E-9258-4BE0996DA181}"/>
+                  </a:ext>
+                </a:extLst>
+              </p:cNvPr>
+              <p:cNvPicPr>
+                <a:picLocks noChangeAspect="1"/>
+              </p:cNvPicPr>
+              <p:nvPr/>
+            </p:nvPicPr>
+            <p:blipFill>
+              <a:blip r:embed="rId18">
+                <a:extLst>
+                  <a:ext uri="{28A0092B-C50C-407E-A947-70E740481C1C}">
+                    <a14:useLocalDpi xmlns:a14="http://schemas.microsoft.com/office/drawing/2010/main" val="0"/>
+                  </a:ext>
+                  <a:ext uri="{96DAC541-7B7A-43D3-8B79-37D633B846F1}">
+                    <asvg:svgBlip xmlns:asvg="http://schemas.microsoft.com/office/drawing/2016/SVG/main" r:embed="rId19"/>
+                  </a:ext>
+                </a:extLst>
+              </a:blip>
+              <a:stretch>
+                <a:fillRect/>
+              </a:stretch>
+            </p:blipFill>
+            <p:spPr>
+              <a:xfrm>
+                <a:off x="901148" y="2166492"/>
+                <a:ext cx="1558042" cy="1558042"/>
+              </a:xfrm>
+              <a:prstGeom prst="rect">
+                <a:avLst/>
+              </a:prstGeom>
+            </p:spPr>
+          </p:pic>
+        </p:grpSp>
+      </p:grpSp>
+      <p:sp>
+        <p:nvSpPr>
+          <p:cNvPr id="25" name="Prostokąt 24">
+            <a:extLst>
+              <a:ext uri="{FF2B5EF4-FFF2-40B4-BE49-F238E27FC236}">
+                <a16:creationId xmlns:a16="http://schemas.microsoft.com/office/drawing/2014/main" id="{7552D539-ACA4-436B-B2ED-44A4CAA474F2}"/>
+              </a:ext>
+            </a:extLst>
+          </p:cNvPr>
+          <p:cNvSpPr/>
+          <p:nvPr/>
+        </p:nvSpPr>
+        <p:spPr>
+          <a:xfrm>
+            <a:off x="4909620" y="4752092"/>
+            <a:ext cx="2925000" cy="1754326"/>
+          </a:xfrm>
+          <a:prstGeom prst="rect">
+            <a:avLst/>
+          </a:prstGeom>
+          <a:noFill/>
+        </p:spPr>
+        <p:txBody>
+          <a:bodyPr wrap="square" lIns="91440" tIns="45720" rIns="91440" bIns="45720">
+            <a:spAutoFit/>
+          </a:bodyPr>
+          <a:lstStyle/>
+          <a:p>
+            <a:pPr algn="ctr"/>
+            <a:r>
+              <a:rPr lang="pl-PL" sz="5400" b="1" dirty="0">
+                <a:ln w="10160">
+                  <a:solidFill>
+                    <a:schemeClr val="accent5"/>
+                  </a:solidFill>
+                  <a:prstDash val="solid"/>
+                </a:ln>
+                <a:solidFill>
+                  <a:srgbClr val="FFFFFF"/>
+                </a:solidFill>
+                <a:effectLst>
+                  <a:outerShdw blurRad="38100" dist="22860" dir="5400000" algn="tl" rotWithShape="0">
+                    <a:srgbClr val="000000">
+                      <a:alpha val="30000"/>
+                    </a:srgbClr>
+                  </a:outerShdw>
+                </a:effectLst>
+              </a:rPr>
+              <a:t>Business </a:t>
+            </a:r>
+            <a:r>
+              <a:rPr lang="pl-PL" sz="5400" b="1" dirty="0" err="1">
+                <a:ln w="10160">
+                  <a:solidFill>
+                    <a:schemeClr val="accent5"/>
+                  </a:solidFill>
+                  <a:prstDash val="solid"/>
+                </a:ln>
+                <a:solidFill>
+                  <a:srgbClr val="FFFFFF"/>
+                </a:solidFill>
+                <a:effectLst>
+                  <a:outerShdw blurRad="38100" dist="22860" dir="5400000" algn="tl" rotWithShape="0">
+                    <a:srgbClr val="000000">
+                      <a:alpha val="30000"/>
+                    </a:srgbClr>
+                  </a:outerShdw>
+                </a:effectLst>
+              </a:rPr>
+              <a:t>first</a:t>
+            </a:r>
+            <a:endParaRPr lang="pl-PL" sz="5400" b="1" cap="none" spc="0" dirty="0">
+              <a:ln w="10160">
+                <a:solidFill>
+                  <a:schemeClr val="accent5"/>
+                </a:solidFill>
+                <a:prstDash val="solid"/>
+              </a:ln>
+              <a:solidFill>
+                <a:srgbClr val="FFFFFF"/>
+              </a:solidFill>
+              <a:effectLst>
+                <a:outerShdw blurRad="38100" dist="22860" dir="5400000" algn="tl" rotWithShape="0">
+                  <a:srgbClr val="000000">
+                    <a:alpha val="30000"/>
+                  </a:srgbClr>
+                </a:outerShdw>
+              </a:effectLst>
+            </a:endParaRPr>
+          </a:p>
+        </p:txBody>
+      </p:sp>
+    </p:spTree>
+    <p:extLst>
+      <p:ext uri="{BB962C8B-B14F-4D97-AF65-F5344CB8AC3E}">
+        <p14:creationId xmlns:p14="http://schemas.microsoft.com/office/powerpoint/2010/main" val="2630656502"/>
+      </p:ext>
+    </p:extLst>
+  </p:cSld>
+  <p:clrMapOvr>
+    <a:masterClrMapping/>
+  </p:clrMapOvr>
+</p:sld>
+</file>
+
+<file path=ppt/slides/slide11.xml><?xml version="1.0" encoding="utf-8"?>
 <p:sld xmlns:a="http://schemas.openxmlformats.org/drawingml/2006/main" xmlns:r="http://schemas.openxmlformats.org/officeDocument/2006/relationships" xmlns:p="http://schemas.openxmlformats.org/presentationml/2006/main">
   <p:cSld>
     <p:bg>
@@ -9736,7 +10612,7 @@
 </p:sld>
 </file>
 
-<file path=ppt/slides/slide11.xml><?xml version="1.0" encoding="utf-8"?>
+<file path=ppt/slides/slide12.xml><?xml version="1.0" encoding="utf-8"?>
 <p:sld xmlns:a="http://schemas.openxmlformats.org/drawingml/2006/main" xmlns:r="http://schemas.openxmlformats.org/officeDocument/2006/relationships" xmlns:p="http://schemas.openxmlformats.org/presentationml/2006/main">
   <p:cSld>
     <p:bg>
@@ -13832,6 +14708,1901 @@
           </a:prstGeom>
         </p:spPr>
       </p:pic>
+      <p:grpSp>
+        <p:nvGrpSpPr>
+          <p:cNvPr id="4" name="Grupa 3">
+            <a:extLst>
+              <a:ext uri="{FF2B5EF4-FFF2-40B4-BE49-F238E27FC236}">
+                <a16:creationId xmlns:a16="http://schemas.microsoft.com/office/drawing/2014/main" id="{C0E88FED-4C5A-47F5-B92C-5A9EBFDF7099}"/>
+              </a:ext>
+            </a:extLst>
+          </p:cNvPr>
+          <p:cNvGrpSpPr/>
+          <p:nvPr/>
+        </p:nvGrpSpPr>
+        <p:grpSpPr>
+          <a:xfrm>
+            <a:off x="3903729" y="399137"/>
+            <a:ext cx="4358035" cy="3377732"/>
+            <a:chOff x="3863973" y="743694"/>
+            <a:chExt cx="4358035" cy="3377732"/>
+          </a:xfrm>
+        </p:grpSpPr>
+        <p:sp>
+          <p:nvSpPr>
+            <p:cNvPr id="3" name="Prostokąt: zaokrąglone rogi 2">
+              <a:extLst>
+                <a:ext uri="{FF2B5EF4-FFF2-40B4-BE49-F238E27FC236}">
+                  <a16:creationId xmlns:a16="http://schemas.microsoft.com/office/drawing/2014/main" id="{E85B1584-C9C2-410D-8F3D-B7D294FBBB09}"/>
+                </a:ext>
+              </a:extLst>
+            </p:cNvPr>
+            <p:cNvSpPr/>
+            <p:nvPr/>
+          </p:nvSpPr>
+          <p:spPr>
+            <a:xfrm>
+              <a:off x="4810538" y="2095416"/>
+              <a:ext cx="2464905" cy="2026010"/>
+            </a:xfrm>
+            <a:prstGeom prst="roundRect">
+              <a:avLst/>
+            </a:prstGeom>
+          </p:spPr>
+          <p:style>
+            <a:lnRef idx="2">
+              <a:schemeClr val="dk1">
+                <a:shade val="50000"/>
+              </a:schemeClr>
+            </a:lnRef>
+            <a:fillRef idx="1">
+              <a:schemeClr val="dk1"/>
+            </a:fillRef>
+            <a:effectRef idx="0">
+              <a:schemeClr val="dk1"/>
+            </a:effectRef>
+            <a:fontRef idx="minor">
+              <a:schemeClr val="lt1"/>
+            </a:fontRef>
+          </p:style>
+          <p:txBody>
+            <a:bodyPr rtlCol="0" anchor="ctr"/>
+            <a:lstStyle/>
+            <a:p>
+              <a:pPr algn="ctr"/>
+              <a:endParaRPr lang="pl-PL"/>
+            </a:p>
+          </p:txBody>
+        </p:sp>
+        <p:sp>
+          <p:nvSpPr>
+            <p:cNvPr id="6" name="Prostokąt 5">
+              <a:extLst>
+                <a:ext uri="{FF2B5EF4-FFF2-40B4-BE49-F238E27FC236}">
+                  <a16:creationId xmlns:a16="http://schemas.microsoft.com/office/drawing/2014/main" id="{909D993E-D231-482A-A961-F70F66588BEA}"/>
+                </a:ext>
+              </a:extLst>
+            </p:cNvPr>
+            <p:cNvSpPr/>
+            <p:nvPr/>
+          </p:nvSpPr>
+          <p:spPr>
+            <a:xfrm>
+              <a:off x="3863974" y="743694"/>
+              <a:ext cx="4358034" cy="707886"/>
+            </a:xfrm>
+            <a:prstGeom prst="rect">
+              <a:avLst/>
+            </a:prstGeom>
+            <a:noFill/>
+          </p:spPr>
+          <p:txBody>
+            <a:bodyPr wrap="square" lIns="91440" tIns="45720" rIns="91440" bIns="45720">
+              <a:spAutoFit/>
+            </a:bodyPr>
+            <a:lstStyle/>
+            <a:p>
+              <a:pPr algn="ctr"/>
+              <a:r>
+                <a:rPr lang="pl-PL" sz="4000" b="1" dirty="0" err="1">
+                  <a:ln w="10160">
+                    <a:solidFill>
+                      <a:schemeClr val="accent5"/>
+                    </a:solidFill>
+                    <a:prstDash val="solid"/>
+                  </a:ln>
+                  <a:solidFill>
+                    <a:srgbClr val="FFFFFF"/>
+                  </a:solidFill>
+                  <a:effectLst>
+                    <a:outerShdw blurRad="38100" dist="22860" dir="5400000" algn="tl" rotWithShape="0">
+                      <a:srgbClr val="000000">
+                        <a:alpha val="30000"/>
+                      </a:srgbClr>
+                    </a:outerShdw>
+                  </a:effectLst>
+                </a:rPr>
+                <a:t>Supertype</a:t>
+              </a:r>
+              <a:r>
+                <a:rPr lang="pl-PL" sz="4000" b="1" dirty="0">
+                  <a:ln w="10160">
+                    <a:solidFill>
+                      <a:schemeClr val="accent5"/>
+                    </a:solidFill>
+                    <a:prstDash val="solid"/>
+                  </a:ln>
+                  <a:solidFill>
+                    <a:srgbClr val="FFFFFF"/>
+                  </a:solidFill>
+                  <a:effectLst>
+                    <a:outerShdw blurRad="38100" dist="22860" dir="5400000" algn="tl" rotWithShape="0">
+                      <a:srgbClr val="000000">
+                        <a:alpha val="30000"/>
+                      </a:srgbClr>
+                    </a:outerShdw>
+                  </a:effectLst>
+                </a:rPr>
+                <a:t> </a:t>
+              </a:r>
+              <a:r>
+                <a:rPr lang="pl-PL" sz="4000" b="1" dirty="0" err="1">
+                  <a:ln w="10160">
+                    <a:solidFill>
+                      <a:schemeClr val="accent5"/>
+                    </a:solidFill>
+                    <a:prstDash val="solid"/>
+                  </a:ln>
+                  <a:solidFill>
+                    <a:srgbClr val="FFFFFF"/>
+                  </a:solidFill>
+                  <a:effectLst>
+                    <a:outerShdw blurRad="38100" dist="22860" dir="5400000" algn="tl" rotWithShape="0">
+                      <a:srgbClr val="000000">
+                        <a:alpha val="30000"/>
+                      </a:srgbClr>
+                    </a:outerShdw>
+                  </a:effectLst>
+                </a:rPr>
+                <a:t>entity</a:t>
+              </a:r>
+              <a:endParaRPr lang="pl-PL" sz="4800" b="1" cap="none" spc="0" dirty="0">
+                <a:ln w="10160">
+                  <a:solidFill>
+                    <a:schemeClr val="accent5"/>
+                  </a:solidFill>
+                  <a:prstDash val="solid"/>
+                </a:ln>
+                <a:solidFill>
+                  <a:srgbClr val="FFFFFF"/>
+                </a:solidFill>
+                <a:effectLst>
+                  <a:outerShdw blurRad="38100" dist="22860" dir="5400000" algn="tl" rotWithShape="0">
+                    <a:srgbClr val="000000">
+                      <a:alpha val="30000"/>
+                    </a:srgbClr>
+                  </a:outerShdw>
+                </a:effectLst>
+              </a:endParaRPr>
+            </a:p>
+          </p:txBody>
+        </p:sp>
+        <p:sp>
+          <p:nvSpPr>
+            <p:cNvPr id="7" name="Prostokąt 6">
+              <a:extLst>
+                <a:ext uri="{FF2B5EF4-FFF2-40B4-BE49-F238E27FC236}">
+                  <a16:creationId xmlns:a16="http://schemas.microsoft.com/office/drawing/2014/main" id="{6AA710DB-A9BE-4F1B-ACA4-386AA3E3983C}"/>
+                </a:ext>
+              </a:extLst>
+            </p:cNvPr>
+            <p:cNvSpPr/>
+            <p:nvPr/>
+          </p:nvSpPr>
+          <p:spPr>
+            <a:xfrm>
+              <a:off x="3863973" y="1387530"/>
+              <a:ext cx="4358034" cy="707886"/>
+            </a:xfrm>
+            <a:prstGeom prst="rect">
+              <a:avLst/>
+            </a:prstGeom>
+            <a:noFill/>
+          </p:spPr>
+          <p:txBody>
+            <a:bodyPr wrap="square" lIns="91440" tIns="45720" rIns="91440" bIns="45720">
+              <a:spAutoFit/>
+            </a:bodyPr>
+            <a:lstStyle/>
+            <a:p>
+              <a:pPr algn="ctr"/>
+              <a:r>
+                <a:rPr lang="pl-PL" sz="4000" b="1" dirty="0">
+                  <a:ln w="10160">
+                    <a:solidFill>
+                      <a:schemeClr val="accent5"/>
+                    </a:solidFill>
+                    <a:prstDash val="solid"/>
+                  </a:ln>
+                  <a:solidFill>
+                    <a:srgbClr val="FFFFFF"/>
+                  </a:solidFill>
+                  <a:effectLst>
+                    <a:outerShdw blurRad="38100" dist="22860" dir="5400000" algn="tl" rotWithShape="0">
+                      <a:srgbClr val="000000">
+                        <a:alpha val="30000"/>
+                      </a:srgbClr>
+                    </a:outerShdw>
+                  </a:effectLst>
+                </a:rPr>
+                <a:t>PARTY</a:t>
+              </a:r>
+              <a:endParaRPr lang="pl-PL" sz="4800" b="1" cap="none" spc="0" dirty="0">
+                <a:ln w="10160">
+                  <a:solidFill>
+                    <a:schemeClr val="accent5"/>
+                  </a:solidFill>
+                  <a:prstDash val="solid"/>
+                </a:ln>
+                <a:solidFill>
+                  <a:srgbClr val="FFFFFF"/>
+                </a:solidFill>
+                <a:effectLst>
+                  <a:outerShdw blurRad="38100" dist="22860" dir="5400000" algn="tl" rotWithShape="0">
+                    <a:srgbClr val="000000">
+                      <a:alpha val="30000"/>
+                    </a:srgbClr>
+                  </a:outerShdw>
+                </a:effectLst>
+              </a:endParaRPr>
+            </a:p>
+          </p:txBody>
+        </p:sp>
+        <p:sp>
+          <p:nvSpPr>
+            <p:cNvPr id="8" name="Prostokąt 7">
+              <a:extLst>
+                <a:ext uri="{FF2B5EF4-FFF2-40B4-BE49-F238E27FC236}">
+                  <a16:creationId xmlns:a16="http://schemas.microsoft.com/office/drawing/2014/main" id="{D0F44734-194B-4113-B3F0-D61723C52537}"/>
+                </a:ext>
+              </a:extLst>
+            </p:cNvPr>
+            <p:cNvSpPr/>
+            <p:nvPr/>
+          </p:nvSpPr>
+          <p:spPr>
+            <a:xfrm>
+              <a:off x="4904267" y="2216032"/>
+              <a:ext cx="2371176" cy="523220"/>
+            </a:xfrm>
+            <a:prstGeom prst="rect">
+              <a:avLst/>
+            </a:prstGeom>
+            <a:noFill/>
+          </p:spPr>
+          <p:txBody>
+            <a:bodyPr wrap="square" lIns="91440" tIns="45720" rIns="91440" bIns="45720">
+              <a:spAutoFit/>
+            </a:bodyPr>
+            <a:lstStyle/>
+            <a:p>
+              <a:r>
+                <a:rPr lang="pl-PL" sz="2800" dirty="0">
+                  <a:ln w="10160">
+                    <a:solidFill>
+                      <a:schemeClr val="bg1"/>
+                    </a:solidFill>
+                    <a:prstDash val="solid"/>
+                  </a:ln>
+                  <a:solidFill>
+                    <a:srgbClr val="FFFFFF"/>
+                  </a:solidFill>
+                  <a:effectLst>
+                    <a:outerShdw blurRad="38100" dist="22860" dir="5400000" algn="tl" rotWithShape="0">
+                      <a:srgbClr val="000000">
+                        <a:alpha val="30000"/>
+                      </a:srgbClr>
+                    </a:outerShdw>
+                  </a:effectLst>
+                  <a:latin typeface="Calibri" panose="020F0502020204030204" pitchFamily="34" charset="0"/>
+                  <a:cs typeface="Calibri" panose="020F0502020204030204" pitchFamily="34" charset="0"/>
+                </a:rPr>
+                <a:t>PARTY</a:t>
+              </a:r>
+              <a:r>
+                <a:rPr lang="pl-PL" sz="2800" b="1" dirty="0">
+                  <a:ln w="10160">
+                    <a:solidFill>
+                      <a:schemeClr val="bg1"/>
+                    </a:solidFill>
+                    <a:prstDash val="solid"/>
+                  </a:ln>
+                  <a:solidFill>
+                    <a:srgbClr val="FFFFFF"/>
+                  </a:solidFill>
+                  <a:effectLst>
+                    <a:outerShdw blurRad="38100" dist="22860" dir="5400000" algn="tl" rotWithShape="0">
+                      <a:srgbClr val="000000">
+                        <a:alpha val="30000"/>
+                      </a:srgbClr>
+                    </a:outerShdw>
+                  </a:effectLst>
+                  <a:latin typeface="Calibri" panose="020F0502020204030204" pitchFamily="34" charset="0"/>
+                  <a:cs typeface="Calibri" panose="020F0502020204030204" pitchFamily="34" charset="0"/>
+                </a:rPr>
+                <a:t>_ID (PK)</a:t>
+              </a:r>
+              <a:endParaRPr lang="pl-PL" sz="3600" b="1" cap="none" spc="0" dirty="0">
+                <a:ln w="10160">
+                  <a:solidFill>
+                    <a:schemeClr val="bg1"/>
+                  </a:solidFill>
+                  <a:prstDash val="solid"/>
+                </a:ln>
+                <a:solidFill>
+                  <a:srgbClr val="FFFFFF"/>
+                </a:solidFill>
+                <a:effectLst>
+                  <a:outerShdw blurRad="38100" dist="22860" dir="5400000" algn="tl" rotWithShape="0">
+                    <a:srgbClr val="000000">
+                      <a:alpha val="30000"/>
+                    </a:srgbClr>
+                  </a:outerShdw>
+                </a:effectLst>
+                <a:latin typeface="Calibri" panose="020F0502020204030204" pitchFamily="34" charset="0"/>
+                <a:cs typeface="Calibri" panose="020F0502020204030204" pitchFamily="34" charset="0"/>
+              </a:endParaRPr>
+            </a:p>
+          </p:txBody>
+        </p:sp>
+        <p:sp>
+          <p:nvSpPr>
+            <p:cNvPr id="9" name="Prostokąt 8">
+              <a:extLst>
+                <a:ext uri="{FF2B5EF4-FFF2-40B4-BE49-F238E27FC236}">
+                  <a16:creationId xmlns:a16="http://schemas.microsoft.com/office/drawing/2014/main" id="{D8C394B0-7196-442A-875F-997F89262DC6}"/>
+                </a:ext>
+              </a:extLst>
+            </p:cNvPr>
+            <p:cNvSpPr/>
+            <p:nvPr/>
+          </p:nvSpPr>
+          <p:spPr>
+            <a:xfrm>
+              <a:off x="4904267" y="3079860"/>
+              <a:ext cx="2371176" cy="523220"/>
+            </a:xfrm>
+            <a:prstGeom prst="rect">
+              <a:avLst/>
+            </a:prstGeom>
+            <a:noFill/>
+          </p:spPr>
+          <p:txBody>
+            <a:bodyPr wrap="square" lIns="91440" tIns="45720" rIns="91440" bIns="45720">
+              <a:spAutoFit/>
+            </a:bodyPr>
+            <a:lstStyle/>
+            <a:p>
+              <a:r>
+                <a:rPr lang="pl-PL" sz="2800" cap="none" spc="0" dirty="0">
+                  <a:ln w="10160">
+                    <a:solidFill>
+                      <a:schemeClr val="bg1"/>
+                    </a:solidFill>
+                    <a:prstDash val="solid"/>
+                  </a:ln>
+                  <a:solidFill>
+                    <a:srgbClr val="FFFFFF"/>
+                  </a:solidFill>
+                  <a:effectLst>
+                    <a:outerShdw blurRad="38100" dist="22860" dir="5400000" algn="tl" rotWithShape="0">
+                      <a:srgbClr val="000000">
+                        <a:alpha val="30000"/>
+                      </a:srgbClr>
+                    </a:outerShdw>
+                  </a:effectLst>
+                  <a:latin typeface="Calibri" panose="020F0502020204030204" pitchFamily="34" charset="0"/>
+                  <a:cs typeface="Calibri" panose="020F0502020204030204" pitchFamily="34" charset="0"/>
+                </a:rPr>
+                <a:t>COMN_ATTR 1</a:t>
+              </a:r>
+              <a:endParaRPr lang="pl-PL" sz="3600" cap="none" spc="0" dirty="0">
+                <a:ln w="10160">
+                  <a:solidFill>
+                    <a:schemeClr val="bg1"/>
+                  </a:solidFill>
+                  <a:prstDash val="solid"/>
+                </a:ln>
+                <a:solidFill>
+                  <a:srgbClr val="FFFFFF"/>
+                </a:solidFill>
+                <a:effectLst>
+                  <a:outerShdw blurRad="38100" dist="22860" dir="5400000" algn="tl" rotWithShape="0">
+                    <a:srgbClr val="000000">
+                      <a:alpha val="30000"/>
+                    </a:srgbClr>
+                  </a:outerShdw>
+                </a:effectLst>
+                <a:latin typeface="Calibri" panose="020F0502020204030204" pitchFamily="34" charset="0"/>
+                <a:cs typeface="Calibri" panose="020F0502020204030204" pitchFamily="34" charset="0"/>
+              </a:endParaRPr>
+            </a:p>
+          </p:txBody>
+        </p:sp>
+        <p:sp>
+          <p:nvSpPr>
+            <p:cNvPr id="10" name="Prostokąt 9">
+              <a:extLst>
+                <a:ext uri="{FF2B5EF4-FFF2-40B4-BE49-F238E27FC236}">
+                  <a16:creationId xmlns:a16="http://schemas.microsoft.com/office/drawing/2014/main" id="{797F1073-69F4-4EBC-BBA8-944FD2812096}"/>
+                </a:ext>
+              </a:extLst>
+            </p:cNvPr>
+            <p:cNvSpPr/>
+            <p:nvPr/>
+          </p:nvSpPr>
+          <p:spPr>
+            <a:xfrm>
+              <a:off x="4904267" y="2647946"/>
+              <a:ext cx="2371176" cy="523220"/>
+            </a:xfrm>
+            <a:prstGeom prst="rect">
+              <a:avLst/>
+            </a:prstGeom>
+            <a:noFill/>
+          </p:spPr>
+          <p:txBody>
+            <a:bodyPr wrap="square" lIns="91440" tIns="45720" rIns="91440" bIns="45720">
+              <a:spAutoFit/>
+            </a:bodyPr>
+            <a:lstStyle/>
+            <a:p>
+              <a:r>
+                <a:rPr lang="pl-PL" sz="2800" dirty="0">
+                  <a:ln w="10160">
+                    <a:solidFill>
+                      <a:schemeClr val="bg1"/>
+                    </a:solidFill>
+                    <a:prstDash val="solid"/>
+                  </a:ln>
+                  <a:solidFill>
+                    <a:srgbClr val="FFFFFF"/>
+                  </a:solidFill>
+                  <a:effectLst>
+                    <a:outerShdw blurRad="38100" dist="22860" dir="5400000" algn="tl" rotWithShape="0">
+                      <a:srgbClr val="000000">
+                        <a:alpha val="30000"/>
+                      </a:srgbClr>
+                    </a:outerShdw>
+                  </a:effectLst>
+                  <a:latin typeface="Calibri" panose="020F0502020204030204" pitchFamily="34" charset="0"/>
+                  <a:cs typeface="Calibri" panose="020F0502020204030204" pitchFamily="34" charset="0"/>
+                </a:rPr>
+                <a:t>SUBTYPE</a:t>
+              </a:r>
+              <a:endParaRPr lang="pl-PL" sz="3600" cap="none" spc="0" dirty="0">
+                <a:ln w="10160">
+                  <a:solidFill>
+                    <a:schemeClr val="bg1"/>
+                  </a:solidFill>
+                  <a:prstDash val="solid"/>
+                </a:ln>
+                <a:solidFill>
+                  <a:srgbClr val="FFFFFF"/>
+                </a:solidFill>
+                <a:effectLst>
+                  <a:outerShdw blurRad="38100" dist="22860" dir="5400000" algn="tl" rotWithShape="0">
+                    <a:srgbClr val="000000">
+                      <a:alpha val="30000"/>
+                    </a:srgbClr>
+                  </a:outerShdw>
+                </a:effectLst>
+                <a:latin typeface="Calibri" panose="020F0502020204030204" pitchFamily="34" charset="0"/>
+                <a:cs typeface="Calibri" panose="020F0502020204030204" pitchFamily="34" charset="0"/>
+              </a:endParaRPr>
+            </a:p>
+          </p:txBody>
+        </p:sp>
+        <p:sp>
+          <p:nvSpPr>
+            <p:cNvPr id="11" name="Prostokąt 10">
+              <a:extLst>
+                <a:ext uri="{FF2B5EF4-FFF2-40B4-BE49-F238E27FC236}">
+                  <a16:creationId xmlns:a16="http://schemas.microsoft.com/office/drawing/2014/main" id="{BEA0E0DD-76B5-4A22-BC47-60C771796CBA}"/>
+                </a:ext>
+              </a:extLst>
+            </p:cNvPr>
+            <p:cNvSpPr/>
+            <p:nvPr/>
+          </p:nvSpPr>
+          <p:spPr>
+            <a:xfrm>
+              <a:off x="4904267" y="3506900"/>
+              <a:ext cx="2371176" cy="523220"/>
+            </a:xfrm>
+            <a:prstGeom prst="rect">
+              <a:avLst/>
+            </a:prstGeom>
+            <a:noFill/>
+          </p:spPr>
+          <p:txBody>
+            <a:bodyPr wrap="square" lIns="91440" tIns="45720" rIns="91440" bIns="45720">
+              <a:spAutoFit/>
+            </a:bodyPr>
+            <a:lstStyle/>
+            <a:p>
+              <a:r>
+                <a:rPr lang="pl-PL" sz="2800" cap="none" spc="0" dirty="0">
+                  <a:ln w="10160">
+                    <a:solidFill>
+                      <a:schemeClr val="bg1"/>
+                    </a:solidFill>
+                    <a:prstDash val="solid"/>
+                  </a:ln>
+                  <a:solidFill>
+                    <a:srgbClr val="FFFFFF"/>
+                  </a:solidFill>
+                  <a:effectLst>
+                    <a:outerShdw blurRad="38100" dist="22860" dir="5400000" algn="tl" rotWithShape="0">
+                      <a:srgbClr val="000000">
+                        <a:alpha val="30000"/>
+                      </a:srgbClr>
+                    </a:outerShdw>
+                  </a:effectLst>
+                  <a:latin typeface="Calibri" panose="020F0502020204030204" pitchFamily="34" charset="0"/>
+                  <a:cs typeface="Calibri" panose="020F0502020204030204" pitchFamily="34" charset="0"/>
+                </a:rPr>
+                <a:t>COMN_ATTR 2</a:t>
+              </a:r>
+              <a:endParaRPr lang="pl-PL" sz="3600" cap="none" spc="0" dirty="0">
+                <a:ln w="10160">
+                  <a:solidFill>
+                    <a:schemeClr val="bg1"/>
+                  </a:solidFill>
+                  <a:prstDash val="solid"/>
+                </a:ln>
+                <a:solidFill>
+                  <a:srgbClr val="FFFFFF"/>
+                </a:solidFill>
+                <a:effectLst>
+                  <a:outerShdw blurRad="38100" dist="22860" dir="5400000" algn="tl" rotWithShape="0">
+                    <a:srgbClr val="000000">
+                      <a:alpha val="30000"/>
+                    </a:srgbClr>
+                  </a:outerShdw>
+                </a:effectLst>
+                <a:latin typeface="Calibri" panose="020F0502020204030204" pitchFamily="34" charset="0"/>
+                <a:cs typeface="Calibri" panose="020F0502020204030204" pitchFamily="34" charset="0"/>
+              </a:endParaRPr>
+            </a:p>
+          </p:txBody>
+        </p:sp>
+      </p:grpSp>
+      <p:grpSp>
+        <p:nvGrpSpPr>
+          <p:cNvPr id="12" name="Grupa 11">
+            <a:extLst>
+              <a:ext uri="{FF2B5EF4-FFF2-40B4-BE49-F238E27FC236}">
+                <a16:creationId xmlns:a16="http://schemas.microsoft.com/office/drawing/2014/main" id="{2D66141C-303F-48AF-BF36-FC0538ABDA29}"/>
+              </a:ext>
+            </a:extLst>
+          </p:cNvPr>
+          <p:cNvGrpSpPr/>
+          <p:nvPr/>
+        </p:nvGrpSpPr>
+        <p:grpSpPr>
+          <a:xfrm>
+            <a:off x="445394" y="2877128"/>
+            <a:ext cx="4358035" cy="3377732"/>
+            <a:chOff x="3863973" y="743694"/>
+            <a:chExt cx="4358035" cy="3377732"/>
+          </a:xfrm>
+        </p:grpSpPr>
+        <p:sp>
+          <p:nvSpPr>
+            <p:cNvPr id="13" name="Prostokąt: zaokrąglone rogi 12">
+              <a:extLst>
+                <a:ext uri="{FF2B5EF4-FFF2-40B4-BE49-F238E27FC236}">
+                  <a16:creationId xmlns:a16="http://schemas.microsoft.com/office/drawing/2014/main" id="{D25D3784-D6E6-4CD0-AA29-4B6679F378DF}"/>
+                </a:ext>
+              </a:extLst>
+            </p:cNvPr>
+            <p:cNvSpPr/>
+            <p:nvPr/>
+          </p:nvSpPr>
+          <p:spPr>
+            <a:xfrm>
+              <a:off x="4810538" y="2095416"/>
+              <a:ext cx="2464905" cy="2026010"/>
+            </a:xfrm>
+            <a:prstGeom prst="roundRect">
+              <a:avLst/>
+            </a:prstGeom>
+          </p:spPr>
+          <p:style>
+            <a:lnRef idx="2">
+              <a:schemeClr val="dk1"/>
+            </a:lnRef>
+            <a:fillRef idx="1">
+              <a:schemeClr val="lt1"/>
+            </a:fillRef>
+            <a:effectRef idx="0">
+              <a:schemeClr val="dk1"/>
+            </a:effectRef>
+            <a:fontRef idx="minor">
+              <a:schemeClr val="dk1"/>
+            </a:fontRef>
+          </p:style>
+          <p:txBody>
+            <a:bodyPr rtlCol="0" anchor="ctr"/>
+            <a:lstStyle/>
+            <a:p>
+              <a:pPr algn="ctr"/>
+              <a:endParaRPr lang="pl-PL"/>
+            </a:p>
+          </p:txBody>
+        </p:sp>
+        <p:sp>
+          <p:nvSpPr>
+            <p:cNvPr id="14" name="Prostokąt 13">
+              <a:extLst>
+                <a:ext uri="{FF2B5EF4-FFF2-40B4-BE49-F238E27FC236}">
+                  <a16:creationId xmlns:a16="http://schemas.microsoft.com/office/drawing/2014/main" id="{86B5EEC7-CC28-4608-9DD2-C1A11FBE7B53}"/>
+                </a:ext>
+              </a:extLst>
+            </p:cNvPr>
+            <p:cNvSpPr/>
+            <p:nvPr/>
+          </p:nvSpPr>
+          <p:spPr>
+            <a:xfrm>
+              <a:off x="3863974" y="743694"/>
+              <a:ext cx="4358034" cy="707886"/>
+            </a:xfrm>
+            <a:prstGeom prst="rect">
+              <a:avLst/>
+            </a:prstGeom>
+            <a:noFill/>
+          </p:spPr>
+          <p:txBody>
+            <a:bodyPr wrap="square" lIns="91440" tIns="45720" rIns="91440" bIns="45720">
+              <a:spAutoFit/>
+            </a:bodyPr>
+            <a:lstStyle/>
+            <a:p>
+              <a:pPr algn="ctr"/>
+              <a:r>
+                <a:rPr lang="pl-PL" sz="4000" b="1" dirty="0" err="1">
+                  <a:ln w="10160">
+                    <a:solidFill>
+                      <a:schemeClr val="accent5"/>
+                    </a:solidFill>
+                    <a:prstDash val="solid"/>
+                  </a:ln>
+                  <a:solidFill>
+                    <a:srgbClr val="FFFFFF"/>
+                  </a:solidFill>
+                  <a:effectLst>
+                    <a:outerShdw blurRad="38100" dist="22860" dir="5400000" algn="tl" rotWithShape="0">
+                      <a:srgbClr val="000000">
+                        <a:alpha val="30000"/>
+                      </a:srgbClr>
+                    </a:outerShdw>
+                  </a:effectLst>
+                </a:rPr>
+                <a:t>Subtype</a:t>
+              </a:r>
+              <a:r>
+                <a:rPr lang="pl-PL" sz="4000" b="1" dirty="0">
+                  <a:ln w="10160">
+                    <a:solidFill>
+                      <a:schemeClr val="accent5"/>
+                    </a:solidFill>
+                    <a:prstDash val="solid"/>
+                  </a:ln>
+                  <a:solidFill>
+                    <a:srgbClr val="FFFFFF"/>
+                  </a:solidFill>
+                  <a:effectLst>
+                    <a:outerShdw blurRad="38100" dist="22860" dir="5400000" algn="tl" rotWithShape="0">
+                      <a:srgbClr val="000000">
+                        <a:alpha val="30000"/>
+                      </a:srgbClr>
+                    </a:outerShdw>
+                  </a:effectLst>
+                </a:rPr>
+                <a:t> </a:t>
+              </a:r>
+              <a:r>
+                <a:rPr lang="pl-PL" sz="4000" b="1" dirty="0" err="1">
+                  <a:ln w="10160">
+                    <a:solidFill>
+                      <a:schemeClr val="accent5"/>
+                    </a:solidFill>
+                    <a:prstDash val="solid"/>
+                  </a:ln>
+                  <a:solidFill>
+                    <a:srgbClr val="FFFFFF"/>
+                  </a:solidFill>
+                  <a:effectLst>
+                    <a:outerShdw blurRad="38100" dist="22860" dir="5400000" algn="tl" rotWithShape="0">
+                      <a:srgbClr val="000000">
+                        <a:alpha val="30000"/>
+                      </a:srgbClr>
+                    </a:outerShdw>
+                  </a:effectLst>
+                </a:rPr>
+                <a:t>entity</a:t>
+              </a:r>
+              <a:endParaRPr lang="pl-PL" sz="4800" b="1" cap="none" spc="0" dirty="0">
+                <a:ln w="10160">
+                  <a:solidFill>
+                    <a:schemeClr val="accent5"/>
+                  </a:solidFill>
+                  <a:prstDash val="solid"/>
+                </a:ln>
+                <a:solidFill>
+                  <a:srgbClr val="FFFFFF"/>
+                </a:solidFill>
+                <a:effectLst>
+                  <a:outerShdw blurRad="38100" dist="22860" dir="5400000" algn="tl" rotWithShape="0">
+                    <a:srgbClr val="000000">
+                      <a:alpha val="30000"/>
+                    </a:srgbClr>
+                  </a:outerShdw>
+                </a:effectLst>
+              </a:endParaRPr>
+            </a:p>
+          </p:txBody>
+        </p:sp>
+        <p:sp>
+          <p:nvSpPr>
+            <p:cNvPr id="15" name="Prostokąt 14">
+              <a:extLst>
+                <a:ext uri="{FF2B5EF4-FFF2-40B4-BE49-F238E27FC236}">
+                  <a16:creationId xmlns:a16="http://schemas.microsoft.com/office/drawing/2014/main" id="{8E789ADE-F978-416D-9AE1-49009284478C}"/>
+                </a:ext>
+              </a:extLst>
+            </p:cNvPr>
+            <p:cNvSpPr/>
+            <p:nvPr/>
+          </p:nvSpPr>
+          <p:spPr>
+            <a:xfrm>
+              <a:off x="3863973" y="1387530"/>
+              <a:ext cx="4358034" cy="707886"/>
+            </a:xfrm>
+            <a:prstGeom prst="rect">
+              <a:avLst/>
+            </a:prstGeom>
+            <a:noFill/>
+          </p:spPr>
+          <p:txBody>
+            <a:bodyPr wrap="square" lIns="91440" tIns="45720" rIns="91440" bIns="45720">
+              <a:spAutoFit/>
+            </a:bodyPr>
+            <a:lstStyle/>
+            <a:p>
+              <a:pPr algn="ctr"/>
+              <a:r>
+                <a:rPr lang="pl-PL" sz="4000" b="1" cap="none" spc="0" dirty="0">
+                  <a:ln w="10160">
+                    <a:solidFill>
+                      <a:schemeClr val="accent5"/>
+                    </a:solidFill>
+                    <a:prstDash val="solid"/>
+                  </a:ln>
+                  <a:solidFill>
+                    <a:srgbClr val="FFFFFF"/>
+                  </a:solidFill>
+                  <a:effectLst>
+                    <a:outerShdw blurRad="38100" dist="22860" dir="5400000" algn="tl" rotWithShape="0">
+                      <a:srgbClr val="000000">
+                        <a:alpha val="30000"/>
+                      </a:srgbClr>
+                    </a:outerShdw>
+                  </a:effectLst>
+                </a:rPr>
+                <a:t>INDIVIDUAL</a:t>
+              </a:r>
+              <a:endParaRPr lang="pl-PL" sz="4800" b="1" cap="none" spc="0" dirty="0">
+                <a:ln w="10160">
+                  <a:solidFill>
+                    <a:schemeClr val="accent5"/>
+                  </a:solidFill>
+                  <a:prstDash val="solid"/>
+                </a:ln>
+                <a:solidFill>
+                  <a:srgbClr val="FFFFFF"/>
+                </a:solidFill>
+                <a:effectLst>
+                  <a:outerShdw blurRad="38100" dist="22860" dir="5400000" algn="tl" rotWithShape="0">
+                    <a:srgbClr val="000000">
+                      <a:alpha val="30000"/>
+                    </a:srgbClr>
+                  </a:outerShdw>
+                </a:effectLst>
+              </a:endParaRPr>
+            </a:p>
+          </p:txBody>
+        </p:sp>
+        <p:sp>
+          <p:nvSpPr>
+            <p:cNvPr id="16" name="Prostokąt 15">
+              <a:extLst>
+                <a:ext uri="{FF2B5EF4-FFF2-40B4-BE49-F238E27FC236}">
+                  <a16:creationId xmlns:a16="http://schemas.microsoft.com/office/drawing/2014/main" id="{DA81EED7-EB46-441A-B487-CA68FDDF54E3}"/>
+                </a:ext>
+              </a:extLst>
+            </p:cNvPr>
+            <p:cNvSpPr/>
+            <p:nvPr/>
+          </p:nvSpPr>
+          <p:spPr>
+            <a:xfrm>
+              <a:off x="4904267" y="2216032"/>
+              <a:ext cx="2371176" cy="523220"/>
+            </a:xfrm>
+            <a:prstGeom prst="rect">
+              <a:avLst/>
+            </a:prstGeom>
+            <a:noFill/>
+          </p:spPr>
+          <p:txBody>
+            <a:bodyPr wrap="square" lIns="91440" tIns="45720" rIns="91440" bIns="45720">
+              <a:spAutoFit/>
+            </a:bodyPr>
+            <a:lstStyle/>
+            <a:p>
+              <a:r>
+                <a:rPr lang="pl-PL" sz="2800" dirty="0">
+                  <a:ln w="0"/>
+                  <a:effectLst>
+                    <a:outerShdw blurRad="38100" dist="19050" dir="2700000" algn="tl" rotWithShape="0">
+                      <a:schemeClr val="dk1">
+                        <a:alpha val="40000"/>
+                      </a:schemeClr>
+                    </a:outerShdw>
+                  </a:effectLst>
+                  <a:latin typeface="Calibri" panose="020F0502020204030204" pitchFamily="34" charset="0"/>
+                  <a:cs typeface="Calibri" panose="020F0502020204030204" pitchFamily="34" charset="0"/>
+                </a:rPr>
+                <a:t>PARTY_ID  (FK)</a:t>
+              </a:r>
+              <a:endParaRPr lang="pl-PL" sz="3600" dirty="0">
+                <a:ln w="0"/>
+                <a:effectLst>
+                  <a:outerShdw blurRad="38100" dist="19050" dir="2700000" algn="tl" rotWithShape="0">
+                    <a:schemeClr val="dk1">
+                      <a:alpha val="40000"/>
+                    </a:schemeClr>
+                  </a:outerShdw>
+                </a:effectLst>
+                <a:latin typeface="Calibri" panose="020F0502020204030204" pitchFamily="34" charset="0"/>
+                <a:cs typeface="Calibri" panose="020F0502020204030204" pitchFamily="34" charset="0"/>
+              </a:endParaRPr>
+            </a:p>
+          </p:txBody>
+        </p:sp>
+        <p:sp>
+          <p:nvSpPr>
+            <p:cNvPr id="17" name="Prostokąt 16">
+              <a:extLst>
+                <a:ext uri="{FF2B5EF4-FFF2-40B4-BE49-F238E27FC236}">
+                  <a16:creationId xmlns:a16="http://schemas.microsoft.com/office/drawing/2014/main" id="{CB021406-3D07-40CD-96DC-6771524908D6}"/>
+                </a:ext>
+              </a:extLst>
+            </p:cNvPr>
+            <p:cNvSpPr/>
+            <p:nvPr/>
+          </p:nvSpPr>
+          <p:spPr>
+            <a:xfrm>
+              <a:off x="4904267" y="3079860"/>
+              <a:ext cx="2371176" cy="523220"/>
+            </a:xfrm>
+            <a:prstGeom prst="rect">
+              <a:avLst/>
+            </a:prstGeom>
+            <a:noFill/>
+          </p:spPr>
+          <p:txBody>
+            <a:bodyPr wrap="square" lIns="91440" tIns="45720" rIns="91440" bIns="45720">
+              <a:spAutoFit/>
+            </a:bodyPr>
+            <a:lstStyle/>
+            <a:p>
+              <a:r>
+                <a:rPr lang="pl-PL" sz="2800" dirty="0">
+                  <a:ln w="0"/>
+                  <a:effectLst>
+                    <a:outerShdw blurRad="38100" dist="19050" dir="2700000" algn="tl" rotWithShape="0">
+                      <a:schemeClr val="dk1">
+                        <a:alpha val="40000"/>
+                      </a:schemeClr>
+                    </a:outerShdw>
+                  </a:effectLst>
+                  <a:latin typeface="Calibri" panose="020F0502020204030204" pitchFamily="34" charset="0"/>
+                  <a:cs typeface="Calibri" panose="020F0502020204030204" pitchFamily="34" charset="0"/>
+                </a:rPr>
+                <a:t>INDIV_ATTR 2</a:t>
+              </a:r>
+              <a:endParaRPr lang="pl-PL" sz="3600" dirty="0">
+                <a:ln w="0"/>
+                <a:effectLst>
+                  <a:outerShdw blurRad="38100" dist="19050" dir="2700000" algn="tl" rotWithShape="0">
+                    <a:schemeClr val="dk1">
+                      <a:alpha val="40000"/>
+                    </a:schemeClr>
+                  </a:outerShdw>
+                </a:effectLst>
+                <a:latin typeface="Calibri" panose="020F0502020204030204" pitchFamily="34" charset="0"/>
+                <a:cs typeface="Calibri" panose="020F0502020204030204" pitchFamily="34" charset="0"/>
+              </a:endParaRPr>
+            </a:p>
+          </p:txBody>
+        </p:sp>
+        <p:sp>
+          <p:nvSpPr>
+            <p:cNvPr id="18" name="Prostokąt 17">
+              <a:extLst>
+                <a:ext uri="{FF2B5EF4-FFF2-40B4-BE49-F238E27FC236}">
+                  <a16:creationId xmlns:a16="http://schemas.microsoft.com/office/drawing/2014/main" id="{0F6306DD-6C01-4D43-94FE-87A3E32AA2AC}"/>
+                </a:ext>
+              </a:extLst>
+            </p:cNvPr>
+            <p:cNvSpPr/>
+            <p:nvPr/>
+          </p:nvSpPr>
+          <p:spPr>
+            <a:xfrm>
+              <a:off x="4904267" y="2647946"/>
+              <a:ext cx="2371176" cy="523220"/>
+            </a:xfrm>
+            <a:prstGeom prst="rect">
+              <a:avLst/>
+            </a:prstGeom>
+            <a:noFill/>
+          </p:spPr>
+          <p:txBody>
+            <a:bodyPr wrap="square" lIns="91440" tIns="45720" rIns="91440" bIns="45720">
+              <a:spAutoFit/>
+            </a:bodyPr>
+            <a:lstStyle/>
+            <a:p>
+              <a:r>
+                <a:rPr lang="pl-PL" sz="2800" dirty="0">
+                  <a:ln w="0"/>
+                  <a:effectLst>
+                    <a:outerShdw blurRad="38100" dist="19050" dir="2700000" algn="tl" rotWithShape="0">
+                      <a:schemeClr val="dk1">
+                        <a:alpha val="40000"/>
+                      </a:schemeClr>
+                    </a:outerShdw>
+                  </a:effectLst>
+                  <a:latin typeface="Calibri" panose="020F0502020204030204" pitchFamily="34" charset="0"/>
+                  <a:cs typeface="Calibri" panose="020F0502020204030204" pitchFamily="34" charset="0"/>
+                </a:rPr>
+                <a:t>INDIV_ATTR 1</a:t>
+              </a:r>
+              <a:endParaRPr lang="pl-PL" sz="3600" dirty="0">
+                <a:ln w="0"/>
+                <a:effectLst>
+                  <a:outerShdw blurRad="38100" dist="19050" dir="2700000" algn="tl" rotWithShape="0">
+                    <a:schemeClr val="dk1">
+                      <a:alpha val="40000"/>
+                    </a:schemeClr>
+                  </a:outerShdw>
+                </a:effectLst>
+                <a:latin typeface="Calibri" panose="020F0502020204030204" pitchFamily="34" charset="0"/>
+                <a:cs typeface="Calibri" panose="020F0502020204030204" pitchFamily="34" charset="0"/>
+              </a:endParaRPr>
+            </a:p>
+          </p:txBody>
+        </p:sp>
+        <p:sp>
+          <p:nvSpPr>
+            <p:cNvPr id="19" name="Prostokąt 18">
+              <a:extLst>
+                <a:ext uri="{FF2B5EF4-FFF2-40B4-BE49-F238E27FC236}">
+                  <a16:creationId xmlns:a16="http://schemas.microsoft.com/office/drawing/2014/main" id="{2ECB65D9-3D1F-42BA-9953-B53FC579F2AA}"/>
+                </a:ext>
+              </a:extLst>
+            </p:cNvPr>
+            <p:cNvSpPr/>
+            <p:nvPr/>
+          </p:nvSpPr>
+          <p:spPr>
+            <a:xfrm>
+              <a:off x="4904267" y="3506900"/>
+              <a:ext cx="2371176" cy="523220"/>
+            </a:xfrm>
+            <a:prstGeom prst="rect">
+              <a:avLst/>
+            </a:prstGeom>
+            <a:noFill/>
+          </p:spPr>
+          <p:txBody>
+            <a:bodyPr wrap="square" lIns="91440" tIns="45720" rIns="91440" bIns="45720">
+              <a:spAutoFit/>
+            </a:bodyPr>
+            <a:lstStyle/>
+            <a:p>
+              <a:r>
+                <a:rPr lang="pl-PL" sz="2800" dirty="0">
+                  <a:ln w="0"/>
+                  <a:effectLst>
+                    <a:outerShdw blurRad="38100" dist="19050" dir="2700000" algn="tl" rotWithShape="0">
+                      <a:schemeClr val="dk1">
+                        <a:alpha val="40000"/>
+                      </a:schemeClr>
+                    </a:outerShdw>
+                  </a:effectLst>
+                  <a:latin typeface="Calibri" panose="020F0502020204030204" pitchFamily="34" charset="0"/>
+                  <a:cs typeface="Calibri" panose="020F0502020204030204" pitchFamily="34" charset="0"/>
+                </a:rPr>
+                <a:t>INDIV_ATTR 3</a:t>
+              </a:r>
+              <a:endParaRPr lang="pl-PL" sz="3600" dirty="0">
+                <a:ln w="0"/>
+                <a:effectLst>
+                  <a:outerShdw blurRad="38100" dist="19050" dir="2700000" algn="tl" rotWithShape="0">
+                    <a:schemeClr val="dk1">
+                      <a:alpha val="40000"/>
+                    </a:schemeClr>
+                  </a:outerShdw>
+                </a:effectLst>
+                <a:latin typeface="Calibri" panose="020F0502020204030204" pitchFamily="34" charset="0"/>
+                <a:cs typeface="Calibri" panose="020F0502020204030204" pitchFamily="34" charset="0"/>
+              </a:endParaRPr>
+            </a:p>
+          </p:txBody>
+        </p:sp>
+      </p:grpSp>
+      <p:grpSp>
+        <p:nvGrpSpPr>
+          <p:cNvPr id="20" name="Grupa 19">
+            <a:extLst>
+              <a:ext uri="{FF2B5EF4-FFF2-40B4-BE49-F238E27FC236}">
+                <a16:creationId xmlns:a16="http://schemas.microsoft.com/office/drawing/2014/main" id="{BDF54896-5277-4800-8C0E-73CAB09DAC96}"/>
+              </a:ext>
+            </a:extLst>
+          </p:cNvPr>
+          <p:cNvGrpSpPr/>
+          <p:nvPr/>
+        </p:nvGrpSpPr>
+        <p:grpSpPr>
+          <a:xfrm>
+            <a:off x="7408928" y="2877128"/>
+            <a:ext cx="4358035" cy="3377732"/>
+            <a:chOff x="3863973" y="743694"/>
+            <a:chExt cx="4358035" cy="3377732"/>
+          </a:xfrm>
+        </p:grpSpPr>
+        <p:sp>
+          <p:nvSpPr>
+            <p:cNvPr id="21" name="Prostokąt: zaokrąglone rogi 20">
+              <a:extLst>
+                <a:ext uri="{FF2B5EF4-FFF2-40B4-BE49-F238E27FC236}">
+                  <a16:creationId xmlns:a16="http://schemas.microsoft.com/office/drawing/2014/main" id="{EA57479A-A81D-445F-88DE-2C405047B207}"/>
+                </a:ext>
+              </a:extLst>
+            </p:cNvPr>
+            <p:cNvSpPr/>
+            <p:nvPr/>
+          </p:nvSpPr>
+          <p:spPr>
+            <a:xfrm>
+              <a:off x="4810538" y="2095416"/>
+              <a:ext cx="2464905" cy="2026010"/>
+            </a:xfrm>
+            <a:prstGeom prst="roundRect">
+              <a:avLst/>
+            </a:prstGeom>
+          </p:spPr>
+          <p:style>
+            <a:lnRef idx="2">
+              <a:schemeClr val="dk1"/>
+            </a:lnRef>
+            <a:fillRef idx="1">
+              <a:schemeClr val="lt1"/>
+            </a:fillRef>
+            <a:effectRef idx="0">
+              <a:schemeClr val="dk1"/>
+            </a:effectRef>
+            <a:fontRef idx="minor">
+              <a:schemeClr val="dk1"/>
+            </a:fontRef>
+          </p:style>
+          <p:txBody>
+            <a:bodyPr rtlCol="0" anchor="ctr"/>
+            <a:lstStyle/>
+            <a:p>
+              <a:pPr algn="ctr"/>
+              <a:endParaRPr lang="pl-PL"/>
+            </a:p>
+          </p:txBody>
+        </p:sp>
+        <p:sp>
+          <p:nvSpPr>
+            <p:cNvPr id="22" name="Prostokąt 21">
+              <a:extLst>
+                <a:ext uri="{FF2B5EF4-FFF2-40B4-BE49-F238E27FC236}">
+                  <a16:creationId xmlns:a16="http://schemas.microsoft.com/office/drawing/2014/main" id="{0357C9EA-D038-45AE-9882-DF94EEA5E0E9}"/>
+                </a:ext>
+              </a:extLst>
+            </p:cNvPr>
+            <p:cNvSpPr/>
+            <p:nvPr/>
+          </p:nvSpPr>
+          <p:spPr>
+            <a:xfrm>
+              <a:off x="3863974" y="743694"/>
+              <a:ext cx="4358034" cy="707886"/>
+            </a:xfrm>
+            <a:prstGeom prst="rect">
+              <a:avLst/>
+            </a:prstGeom>
+            <a:noFill/>
+          </p:spPr>
+          <p:txBody>
+            <a:bodyPr wrap="square" lIns="91440" tIns="45720" rIns="91440" bIns="45720">
+              <a:spAutoFit/>
+            </a:bodyPr>
+            <a:lstStyle/>
+            <a:p>
+              <a:pPr algn="ctr"/>
+              <a:r>
+                <a:rPr lang="pl-PL" sz="4000" b="1" dirty="0" err="1">
+                  <a:ln w="10160">
+                    <a:solidFill>
+                      <a:schemeClr val="accent5"/>
+                    </a:solidFill>
+                    <a:prstDash val="solid"/>
+                  </a:ln>
+                  <a:solidFill>
+                    <a:srgbClr val="FFFFFF"/>
+                  </a:solidFill>
+                  <a:effectLst>
+                    <a:outerShdw blurRad="38100" dist="22860" dir="5400000" algn="tl" rotWithShape="0">
+                      <a:srgbClr val="000000">
+                        <a:alpha val="30000"/>
+                      </a:srgbClr>
+                    </a:outerShdw>
+                  </a:effectLst>
+                </a:rPr>
+                <a:t>Subtype</a:t>
+              </a:r>
+              <a:r>
+                <a:rPr lang="pl-PL" sz="4000" b="1" dirty="0">
+                  <a:ln w="10160">
+                    <a:solidFill>
+                      <a:schemeClr val="accent5"/>
+                    </a:solidFill>
+                    <a:prstDash val="solid"/>
+                  </a:ln>
+                  <a:solidFill>
+                    <a:srgbClr val="FFFFFF"/>
+                  </a:solidFill>
+                  <a:effectLst>
+                    <a:outerShdw blurRad="38100" dist="22860" dir="5400000" algn="tl" rotWithShape="0">
+                      <a:srgbClr val="000000">
+                        <a:alpha val="30000"/>
+                      </a:srgbClr>
+                    </a:outerShdw>
+                  </a:effectLst>
+                </a:rPr>
+                <a:t> </a:t>
+              </a:r>
+              <a:r>
+                <a:rPr lang="pl-PL" sz="4000" b="1" dirty="0" err="1">
+                  <a:ln w="10160">
+                    <a:solidFill>
+                      <a:schemeClr val="accent5"/>
+                    </a:solidFill>
+                    <a:prstDash val="solid"/>
+                  </a:ln>
+                  <a:solidFill>
+                    <a:srgbClr val="FFFFFF"/>
+                  </a:solidFill>
+                  <a:effectLst>
+                    <a:outerShdw blurRad="38100" dist="22860" dir="5400000" algn="tl" rotWithShape="0">
+                      <a:srgbClr val="000000">
+                        <a:alpha val="30000"/>
+                      </a:srgbClr>
+                    </a:outerShdw>
+                  </a:effectLst>
+                </a:rPr>
+                <a:t>entity</a:t>
+              </a:r>
+              <a:endParaRPr lang="pl-PL" sz="4800" b="1" cap="none" spc="0" dirty="0">
+                <a:ln w="10160">
+                  <a:solidFill>
+                    <a:schemeClr val="accent5"/>
+                  </a:solidFill>
+                  <a:prstDash val="solid"/>
+                </a:ln>
+                <a:solidFill>
+                  <a:srgbClr val="FFFFFF"/>
+                </a:solidFill>
+                <a:effectLst>
+                  <a:outerShdw blurRad="38100" dist="22860" dir="5400000" algn="tl" rotWithShape="0">
+                    <a:srgbClr val="000000">
+                      <a:alpha val="30000"/>
+                    </a:srgbClr>
+                  </a:outerShdw>
+                </a:effectLst>
+              </a:endParaRPr>
+            </a:p>
+          </p:txBody>
+        </p:sp>
+        <p:sp>
+          <p:nvSpPr>
+            <p:cNvPr id="23" name="Prostokąt 22">
+              <a:extLst>
+                <a:ext uri="{FF2B5EF4-FFF2-40B4-BE49-F238E27FC236}">
+                  <a16:creationId xmlns:a16="http://schemas.microsoft.com/office/drawing/2014/main" id="{DD3F829D-5BCA-4018-AA66-DD70E7D9ADE8}"/>
+                </a:ext>
+              </a:extLst>
+            </p:cNvPr>
+            <p:cNvSpPr/>
+            <p:nvPr/>
+          </p:nvSpPr>
+          <p:spPr>
+            <a:xfrm>
+              <a:off x="3863973" y="1387530"/>
+              <a:ext cx="4358034" cy="707886"/>
+            </a:xfrm>
+            <a:prstGeom prst="rect">
+              <a:avLst/>
+            </a:prstGeom>
+            <a:noFill/>
+          </p:spPr>
+          <p:txBody>
+            <a:bodyPr wrap="square" lIns="91440" tIns="45720" rIns="91440" bIns="45720">
+              <a:spAutoFit/>
+            </a:bodyPr>
+            <a:lstStyle/>
+            <a:p>
+              <a:pPr algn="ctr"/>
+              <a:r>
+                <a:rPr lang="pl-PL" sz="4000" b="1" cap="none" spc="0" dirty="0">
+                  <a:ln w="10160">
+                    <a:solidFill>
+                      <a:schemeClr val="accent5"/>
+                    </a:solidFill>
+                    <a:prstDash val="solid"/>
+                  </a:ln>
+                  <a:solidFill>
+                    <a:srgbClr val="FFFFFF"/>
+                  </a:solidFill>
+                  <a:effectLst>
+                    <a:outerShdw blurRad="38100" dist="22860" dir="5400000" algn="tl" rotWithShape="0">
+                      <a:srgbClr val="000000">
+                        <a:alpha val="30000"/>
+                      </a:srgbClr>
+                    </a:outerShdw>
+                  </a:effectLst>
+                </a:rPr>
+                <a:t>ORGANIZATION</a:t>
+              </a:r>
+              <a:endParaRPr lang="pl-PL" sz="4800" b="1" cap="none" spc="0" dirty="0">
+                <a:ln w="10160">
+                  <a:solidFill>
+                    <a:schemeClr val="accent5"/>
+                  </a:solidFill>
+                  <a:prstDash val="solid"/>
+                </a:ln>
+                <a:solidFill>
+                  <a:srgbClr val="FFFFFF"/>
+                </a:solidFill>
+                <a:effectLst>
+                  <a:outerShdw blurRad="38100" dist="22860" dir="5400000" algn="tl" rotWithShape="0">
+                    <a:srgbClr val="000000">
+                      <a:alpha val="30000"/>
+                    </a:srgbClr>
+                  </a:outerShdw>
+                </a:effectLst>
+              </a:endParaRPr>
+            </a:p>
+          </p:txBody>
+        </p:sp>
+        <p:sp>
+          <p:nvSpPr>
+            <p:cNvPr id="24" name="Prostokąt 23">
+              <a:extLst>
+                <a:ext uri="{FF2B5EF4-FFF2-40B4-BE49-F238E27FC236}">
+                  <a16:creationId xmlns:a16="http://schemas.microsoft.com/office/drawing/2014/main" id="{F8A951E5-A365-4642-9183-E84690EDF4BA}"/>
+                </a:ext>
+              </a:extLst>
+            </p:cNvPr>
+            <p:cNvSpPr/>
+            <p:nvPr/>
+          </p:nvSpPr>
+          <p:spPr>
+            <a:xfrm>
+              <a:off x="4904267" y="2216032"/>
+              <a:ext cx="2371176" cy="523220"/>
+            </a:xfrm>
+            <a:prstGeom prst="rect">
+              <a:avLst/>
+            </a:prstGeom>
+            <a:noFill/>
+          </p:spPr>
+          <p:txBody>
+            <a:bodyPr wrap="square" lIns="91440" tIns="45720" rIns="91440" bIns="45720">
+              <a:spAutoFit/>
+            </a:bodyPr>
+            <a:lstStyle/>
+            <a:p>
+              <a:r>
+                <a:rPr lang="pl-PL" sz="2800" dirty="0">
+                  <a:ln w="0"/>
+                  <a:effectLst>
+                    <a:outerShdw blurRad="38100" dist="19050" dir="2700000" algn="tl" rotWithShape="0">
+                      <a:schemeClr val="dk1">
+                        <a:alpha val="40000"/>
+                      </a:schemeClr>
+                    </a:outerShdw>
+                  </a:effectLst>
+                  <a:latin typeface="Calibri" panose="020F0502020204030204" pitchFamily="34" charset="0"/>
+                  <a:cs typeface="Calibri" panose="020F0502020204030204" pitchFamily="34" charset="0"/>
+                </a:rPr>
+                <a:t>PARTY_ID  (FK)</a:t>
+              </a:r>
+              <a:endParaRPr lang="pl-PL" sz="3600" dirty="0">
+                <a:ln w="0"/>
+                <a:effectLst>
+                  <a:outerShdw blurRad="38100" dist="19050" dir="2700000" algn="tl" rotWithShape="0">
+                    <a:schemeClr val="dk1">
+                      <a:alpha val="40000"/>
+                    </a:schemeClr>
+                  </a:outerShdw>
+                </a:effectLst>
+                <a:latin typeface="Calibri" panose="020F0502020204030204" pitchFamily="34" charset="0"/>
+                <a:cs typeface="Calibri" panose="020F0502020204030204" pitchFamily="34" charset="0"/>
+              </a:endParaRPr>
+            </a:p>
+          </p:txBody>
+        </p:sp>
+        <p:sp>
+          <p:nvSpPr>
+            <p:cNvPr id="25" name="Prostokąt 24">
+              <a:extLst>
+                <a:ext uri="{FF2B5EF4-FFF2-40B4-BE49-F238E27FC236}">
+                  <a16:creationId xmlns:a16="http://schemas.microsoft.com/office/drawing/2014/main" id="{194BB074-F4A8-4F4B-B02A-CAE1F99565BE}"/>
+                </a:ext>
+              </a:extLst>
+            </p:cNvPr>
+            <p:cNvSpPr/>
+            <p:nvPr/>
+          </p:nvSpPr>
+          <p:spPr>
+            <a:xfrm>
+              <a:off x="4904267" y="3079860"/>
+              <a:ext cx="2371176" cy="523220"/>
+            </a:xfrm>
+            <a:prstGeom prst="rect">
+              <a:avLst/>
+            </a:prstGeom>
+            <a:noFill/>
+          </p:spPr>
+          <p:txBody>
+            <a:bodyPr wrap="square" lIns="91440" tIns="45720" rIns="91440" bIns="45720">
+              <a:spAutoFit/>
+            </a:bodyPr>
+            <a:lstStyle/>
+            <a:p>
+              <a:r>
+                <a:rPr lang="pl-PL" sz="2800" dirty="0">
+                  <a:ln w="0"/>
+                  <a:effectLst>
+                    <a:outerShdw blurRad="38100" dist="19050" dir="2700000" algn="tl" rotWithShape="0">
+                      <a:schemeClr val="dk1">
+                        <a:alpha val="40000"/>
+                      </a:schemeClr>
+                    </a:outerShdw>
+                  </a:effectLst>
+                  <a:latin typeface="Calibri" panose="020F0502020204030204" pitchFamily="34" charset="0"/>
+                  <a:cs typeface="Calibri" panose="020F0502020204030204" pitchFamily="34" charset="0"/>
+                </a:rPr>
+                <a:t>ORG_ATTR 2</a:t>
+              </a:r>
+              <a:endParaRPr lang="pl-PL" sz="3600" dirty="0">
+                <a:ln w="0"/>
+                <a:effectLst>
+                  <a:outerShdw blurRad="38100" dist="19050" dir="2700000" algn="tl" rotWithShape="0">
+                    <a:schemeClr val="dk1">
+                      <a:alpha val="40000"/>
+                    </a:schemeClr>
+                  </a:outerShdw>
+                </a:effectLst>
+                <a:latin typeface="Calibri" panose="020F0502020204030204" pitchFamily="34" charset="0"/>
+                <a:cs typeface="Calibri" panose="020F0502020204030204" pitchFamily="34" charset="0"/>
+              </a:endParaRPr>
+            </a:p>
+          </p:txBody>
+        </p:sp>
+        <p:sp>
+          <p:nvSpPr>
+            <p:cNvPr id="26" name="Prostokąt 25">
+              <a:extLst>
+                <a:ext uri="{FF2B5EF4-FFF2-40B4-BE49-F238E27FC236}">
+                  <a16:creationId xmlns:a16="http://schemas.microsoft.com/office/drawing/2014/main" id="{16759616-A7C1-4735-8A7F-FB485FEC91A0}"/>
+                </a:ext>
+              </a:extLst>
+            </p:cNvPr>
+            <p:cNvSpPr/>
+            <p:nvPr/>
+          </p:nvSpPr>
+          <p:spPr>
+            <a:xfrm>
+              <a:off x="4904267" y="2647946"/>
+              <a:ext cx="2371176" cy="523220"/>
+            </a:xfrm>
+            <a:prstGeom prst="rect">
+              <a:avLst/>
+            </a:prstGeom>
+            <a:noFill/>
+          </p:spPr>
+          <p:txBody>
+            <a:bodyPr wrap="square" lIns="91440" tIns="45720" rIns="91440" bIns="45720">
+              <a:spAutoFit/>
+            </a:bodyPr>
+            <a:lstStyle/>
+            <a:p>
+              <a:r>
+                <a:rPr lang="pl-PL" sz="2800" dirty="0">
+                  <a:ln w="0"/>
+                  <a:effectLst>
+                    <a:outerShdw blurRad="38100" dist="19050" dir="2700000" algn="tl" rotWithShape="0">
+                      <a:schemeClr val="dk1">
+                        <a:alpha val="40000"/>
+                      </a:schemeClr>
+                    </a:outerShdw>
+                  </a:effectLst>
+                  <a:latin typeface="Calibri" panose="020F0502020204030204" pitchFamily="34" charset="0"/>
+                  <a:cs typeface="Calibri" panose="020F0502020204030204" pitchFamily="34" charset="0"/>
+                </a:rPr>
+                <a:t>ORG_ATTR 1</a:t>
+              </a:r>
+              <a:endParaRPr lang="pl-PL" sz="3600" dirty="0">
+                <a:ln w="0"/>
+                <a:effectLst>
+                  <a:outerShdw blurRad="38100" dist="19050" dir="2700000" algn="tl" rotWithShape="0">
+                    <a:schemeClr val="dk1">
+                      <a:alpha val="40000"/>
+                    </a:schemeClr>
+                  </a:outerShdw>
+                </a:effectLst>
+                <a:latin typeface="Calibri" panose="020F0502020204030204" pitchFamily="34" charset="0"/>
+                <a:cs typeface="Calibri" panose="020F0502020204030204" pitchFamily="34" charset="0"/>
+              </a:endParaRPr>
+            </a:p>
+          </p:txBody>
+        </p:sp>
+        <p:sp>
+          <p:nvSpPr>
+            <p:cNvPr id="27" name="Prostokąt 26">
+              <a:extLst>
+                <a:ext uri="{FF2B5EF4-FFF2-40B4-BE49-F238E27FC236}">
+                  <a16:creationId xmlns:a16="http://schemas.microsoft.com/office/drawing/2014/main" id="{2BC755F2-026F-4570-8516-07082339F820}"/>
+                </a:ext>
+              </a:extLst>
+            </p:cNvPr>
+            <p:cNvSpPr/>
+            <p:nvPr/>
+          </p:nvSpPr>
+          <p:spPr>
+            <a:xfrm>
+              <a:off x="4904267" y="3506900"/>
+              <a:ext cx="2371176" cy="523220"/>
+            </a:xfrm>
+            <a:prstGeom prst="rect">
+              <a:avLst/>
+            </a:prstGeom>
+            <a:noFill/>
+          </p:spPr>
+          <p:txBody>
+            <a:bodyPr wrap="square" lIns="91440" tIns="45720" rIns="91440" bIns="45720">
+              <a:spAutoFit/>
+            </a:bodyPr>
+            <a:lstStyle/>
+            <a:p>
+              <a:r>
+                <a:rPr lang="pl-PL" sz="2800" dirty="0">
+                  <a:ln w="0"/>
+                  <a:effectLst>
+                    <a:outerShdw blurRad="38100" dist="19050" dir="2700000" algn="tl" rotWithShape="0">
+                      <a:schemeClr val="dk1">
+                        <a:alpha val="40000"/>
+                      </a:schemeClr>
+                    </a:outerShdw>
+                  </a:effectLst>
+                  <a:latin typeface="Calibri" panose="020F0502020204030204" pitchFamily="34" charset="0"/>
+                  <a:cs typeface="Calibri" panose="020F0502020204030204" pitchFamily="34" charset="0"/>
+                </a:rPr>
+                <a:t>ORG_ATTR 3</a:t>
+              </a:r>
+              <a:endParaRPr lang="pl-PL" sz="3600" dirty="0">
+                <a:ln w="0"/>
+                <a:effectLst>
+                  <a:outerShdw blurRad="38100" dist="19050" dir="2700000" algn="tl" rotWithShape="0">
+                    <a:schemeClr val="dk1">
+                      <a:alpha val="40000"/>
+                    </a:schemeClr>
+                  </a:outerShdw>
+                </a:effectLst>
+                <a:latin typeface="Calibri" panose="020F0502020204030204" pitchFamily="34" charset="0"/>
+                <a:cs typeface="Calibri" panose="020F0502020204030204" pitchFamily="34" charset="0"/>
+              </a:endParaRPr>
+            </a:p>
+          </p:txBody>
+        </p:sp>
+      </p:grpSp>
+      <p:sp>
+        <p:nvSpPr>
+          <p:cNvPr id="29" name="Cięciwa 28">
+            <a:extLst>
+              <a:ext uri="{FF2B5EF4-FFF2-40B4-BE49-F238E27FC236}">
+                <a16:creationId xmlns:a16="http://schemas.microsoft.com/office/drawing/2014/main" id="{2D292655-DB93-4026-A176-F163538FB898}"/>
+              </a:ext>
+            </a:extLst>
+          </p:cNvPr>
+          <p:cNvSpPr/>
+          <p:nvPr/>
+        </p:nvSpPr>
+        <p:spPr>
+          <a:xfrm rot="5564808">
+            <a:off x="5804029" y="4320563"/>
+            <a:ext cx="556590" cy="523220"/>
+          </a:xfrm>
+          <a:prstGeom prst="chord">
+            <a:avLst>
+              <a:gd name="adj1" fmla="val 5129935"/>
+              <a:gd name="adj2" fmla="val 16200000"/>
+            </a:avLst>
+          </a:prstGeom>
+          <a:ln>
+            <a:solidFill>
+              <a:schemeClr val="tx1"/>
+            </a:solidFill>
+          </a:ln>
+        </p:spPr>
+        <p:style>
+          <a:lnRef idx="2">
+            <a:schemeClr val="accent6"/>
+          </a:lnRef>
+          <a:fillRef idx="1">
+            <a:schemeClr val="lt1"/>
+          </a:fillRef>
+          <a:effectRef idx="0">
+            <a:schemeClr val="accent6"/>
+          </a:effectRef>
+          <a:fontRef idx="minor">
+            <a:schemeClr val="dk1"/>
+          </a:fontRef>
+        </p:style>
+        <p:txBody>
+          <a:bodyPr rtlCol="0" anchor="ctr"/>
+          <a:lstStyle/>
+          <a:p>
+            <a:pPr algn="ctr"/>
+            <a:endParaRPr lang="pl-PL"/>
+          </a:p>
+        </p:txBody>
+      </p:sp>
+      <p:grpSp>
+        <p:nvGrpSpPr>
+          <p:cNvPr id="41" name="Grupa 40">
+            <a:extLst>
+              <a:ext uri="{FF2B5EF4-FFF2-40B4-BE49-F238E27FC236}">
+                <a16:creationId xmlns:a16="http://schemas.microsoft.com/office/drawing/2014/main" id="{E1F6F586-508F-43FC-94C9-4ABBDB3962DA}"/>
+              </a:ext>
+            </a:extLst>
+          </p:cNvPr>
+          <p:cNvGrpSpPr/>
+          <p:nvPr/>
+        </p:nvGrpSpPr>
+        <p:grpSpPr>
+          <a:xfrm>
+            <a:off x="5812792" y="4349466"/>
+            <a:ext cx="556153" cy="240719"/>
+            <a:chOff x="5820743" y="4349466"/>
+            <a:chExt cx="556153" cy="240719"/>
+          </a:xfrm>
+        </p:grpSpPr>
+        <p:cxnSp>
+          <p:nvCxnSpPr>
+            <p:cNvPr id="31" name="Łącznik prosty 30">
+              <a:extLst>
+                <a:ext uri="{FF2B5EF4-FFF2-40B4-BE49-F238E27FC236}">
+                  <a16:creationId xmlns:a16="http://schemas.microsoft.com/office/drawing/2014/main" id="{4E0DDB48-9197-4189-AF76-57FCA6F6DD0A}"/>
+                </a:ext>
+              </a:extLst>
+            </p:cNvPr>
+            <p:cNvCxnSpPr>
+              <a:cxnSpLocks/>
+              <a:stCxn id="29" idx="0"/>
+            </p:cNvCxnSpPr>
+            <p:nvPr/>
+          </p:nvCxnSpPr>
+          <p:spPr>
+            <a:xfrm flipV="1">
+              <a:off x="5820743" y="4349466"/>
+              <a:ext cx="397178" cy="240719"/>
+            </a:xfrm>
+            <a:prstGeom prst="line">
+              <a:avLst/>
+            </a:prstGeom>
+            <a:ln w="12700"/>
+          </p:spPr>
+          <p:style>
+            <a:lnRef idx="1">
+              <a:schemeClr val="dk1"/>
+            </a:lnRef>
+            <a:fillRef idx="0">
+              <a:schemeClr val="dk1"/>
+            </a:fillRef>
+            <a:effectRef idx="0">
+              <a:schemeClr val="dk1"/>
+            </a:effectRef>
+            <a:fontRef idx="minor">
+              <a:schemeClr val="tx1"/>
+            </a:fontRef>
+          </p:style>
+        </p:cxnSp>
+        <p:cxnSp>
+          <p:nvCxnSpPr>
+            <p:cNvPr id="33" name="Łącznik prosty 32">
+              <a:extLst>
+                <a:ext uri="{FF2B5EF4-FFF2-40B4-BE49-F238E27FC236}">
+                  <a16:creationId xmlns:a16="http://schemas.microsoft.com/office/drawing/2014/main" id="{AF2ED265-49EE-4E39-9258-F2288A1DD426}"/>
+                </a:ext>
+              </a:extLst>
+            </p:cNvPr>
+            <p:cNvCxnSpPr>
+              <a:cxnSpLocks/>
+            </p:cNvCxnSpPr>
+            <p:nvPr/>
+          </p:nvCxnSpPr>
+          <p:spPr>
+            <a:xfrm>
+              <a:off x="5939624" y="4349466"/>
+              <a:ext cx="437272" cy="232707"/>
+            </a:xfrm>
+            <a:prstGeom prst="line">
+              <a:avLst/>
+            </a:prstGeom>
+            <a:ln w="12700"/>
+          </p:spPr>
+          <p:style>
+            <a:lnRef idx="1">
+              <a:schemeClr val="dk1"/>
+            </a:lnRef>
+            <a:fillRef idx="0">
+              <a:schemeClr val="dk1"/>
+            </a:fillRef>
+            <a:effectRef idx="0">
+              <a:schemeClr val="dk1"/>
+            </a:effectRef>
+            <a:fontRef idx="minor">
+              <a:schemeClr val="tx1"/>
+            </a:fontRef>
+          </p:style>
+        </p:cxnSp>
+      </p:grpSp>
+      <p:cxnSp>
+        <p:nvCxnSpPr>
+          <p:cNvPr id="40" name="Łącznik prosty 39">
+            <a:extLst>
+              <a:ext uri="{FF2B5EF4-FFF2-40B4-BE49-F238E27FC236}">
+                <a16:creationId xmlns:a16="http://schemas.microsoft.com/office/drawing/2014/main" id="{248A0E48-D209-4751-9ED0-1B1D19F546F8}"/>
+              </a:ext>
+            </a:extLst>
+          </p:cNvPr>
+          <p:cNvCxnSpPr>
+            <a:stCxn id="3" idx="2"/>
+          </p:cNvCxnSpPr>
+          <p:nvPr/>
+        </p:nvCxnSpPr>
+        <p:spPr>
+          <a:xfrm flipH="1">
+            <a:off x="6082746" y="3776869"/>
+            <a:ext cx="1" cy="514791"/>
+          </a:xfrm>
+          <a:prstGeom prst="line">
+            <a:avLst/>
+          </a:prstGeom>
+          <a:ln w="38100">
+            <a:solidFill>
+              <a:schemeClr val="bg1"/>
+            </a:solidFill>
+          </a:ln>
+        </p:spPr>
+        <p:style>
+          <a:lnRef idx="1">
+            <a:schemeClr val="dk1"/>
+          </a:lnRef>
+          <a:fillRef idx="0">
+            <a:schemeClr val="dk1"/>
+          </a:fillRef>
+          <a:effectRef idx="0">
+            <a:schemeClr val="dk1"/>
+          </a:effectRef>
+          <a:fontRef idx="minor">
+            <a:schemeClr val="tx1"/>
+          </a:fontRef>
+        </p:style>
+      </p:cxnSp>
+      <p:cxnSp>
+        <p:nvCxnSpPr>
+          <p:cNvPr id="42" name="Łącznik prosty 41">
+            <a:extLst>
+              <a:ext uri="{FF2B5EF4-FFF2-40B4-BE49-F238E27FC236}">
+                <a16:creationId xmlns:a16="http://schemas.microsoft.com/office/drawing/2014/main" id="{5079955B-DFF6-4692-B34F-0C387F2F19C9}"/>
+              </a:ext>
+            </a:extLst>
+          </p:cNvPr>
+          <p:cNvCxnSpPr>
+            <a:cxnSpLocks/>
+          </p:cNvCxnSpPr>
+          <p:nvPr/>
+        </p:nvCxnSpPr>
+        <p:spPr>
+          <a:xfrm>
+            <a:off x="6356970" y="4570271"/>
+            <a:ext cx="1998523" cy="0"/>
+          </a:xfrm>
+          <a:prstGeom prst="line">
+            <a:avLst/>
+          </a:prstGeom>
+          <a:ln w="38100">
+            <a:solidFill>
+              <a:schemeClr val="bg1"/>
+            </a:solidFill>
+          </a:ln>
+        </p:spPr>
+        <p:style>
+          <a:lnRef idx="1">
+            <a:schemeClr val="dk1"/>
+          </a:lnRef>
+          <a:fillRef idx="0">
+            <a:schemeClr val="dk1"/>
+          </a:fillRef>
+          <a:effectRef idx="0">
+            <a:schemeClr val="dk1"/>
+          </a:effectRef>
+          <a:fontRef idx="minor">
+            <a:schemeClr val="tx1"/>
+          </a:fontRef>
+        </p:style>
+      </p:cxnSp>
+      <p:cxnSp>
+        <p:nvCxnSpPr>
+          <p:cNvPr id="45" name="Łącznik prosty 44">
+            <a:extLst>
+              <a:ext uri="{FF2B5EF4-FFF2-40B4-BE49-F238E27FC236}">
+                <a16:creationId xmlns:a16="http://schemas.microsoft.com/office/drawing/2014/main" id="{D7F8C3EE-3B14-4B0D-837D-EA6AC52E5F3D}"/>
+              </a:ext>
+            </a:extLst>
+          </p:cNvPr>
+          <p:cNvCxnSpPr>
+            <a:cxnSpLocks/>
+          </p:cNvCxnSpPr>
+          <p:nvPr/>
+        </p:nvCxnSpPr>
+        <p:spPr>
+          <a:xfrm>
+            <a:off x="3804166" y="4561916"/>
+            <a:ext cx="1998523" cy="0"/>
+          </a:xfrm>
+          <a:prstGeom prst="line">
+            <a:avLst/>
+          </a:prstGeom>
+          <a:ln w="38100">
+            <a:solidFill>
+              <a:schemeClr val="bg1"/>
+            </a:solidFill>
+          </a:ln>
+        </p:spPr>
+        <p:style>
+          <a:lnRef idx="1">
+            <a:schemeClr val="dk1"/>
+          </a:lnRef>
+          <a:fillRef idx="0">
+            <a:schemeClr val="dk1"/>
+          </a:fillRef>
+          <a:effectRef idx="0">
+            <a:schemeClr val="dk1"/>
+          </a:effectRef>
+          <a:fontRef idx="minor">
+            <a:schemeClr val="tx1"/>
+          </a:fontRef>
+        </p:style>
+      </p:cxnSp>
+    </p:spTree>
+    <p:extLst>
+      <p:ext uri="{BB962C8B-B14F-4D97-AF65-F5344CB8AC3E}">
+        <p14:creationId xmlns:p14="http://schemas.microsoft.com/office/powerpoint/2010/main" val="1703100153"/>
+      </p:ext>
+    </p:extLst>
+  </p:cSld>
+  <p:clrMapOvr>
+    <a:masterClrMapping/>
+  </p:clrMapOvr>
+</p:sld>
+</file>
+
+<file path=ppt/slides/slide3.xml><?xml version="1.0" encoding="utf-8"?>
+<p:sld xmlns:a="http://schemas.openxmlformats.org/drawingml/2006/main" xmlns:r="http://schemas.openxmlformats.org/officeDocument/2006/relationships" xmlns:p="http://schemas.openxmlformats.org/presentationml/2006/main">
+  <p:cSld>
+    <p:bg>
+      <p:bgPr>
+        <a:gradFill>
+          <a:gsLst>
+            <a:gs pos="54000">
+              <a:srgbClr val="07A1D7"/>
+            </a:gs>
+            <a:gs pos="100000">
+              <a:srgbClr val="11CFD9"/>
+            </a:gs>
+          </a:gsLst>
+          <a:lin ang="5400000" scaled="1"/>
+        </a:gradFill>
+        <a:effectLst/>
+      </p:bgPr>
+    </p:bg>
+    <p:spTree>
+      <p:nvGrpSpPr>
+        <p:cNvPr id="1" name=""/>
+        <p:cNvGrpSpPr/>
+        <p:nvPr/>
+      </p:nvGrpSpPr>
+      <p:grpSpPr>
+        <a:xfrm>
+          <a:off x="0" y="0"/>
+          <a:ext cx="0" cy="0"/>
+          <a:chOff x="0" y="0"/>
+          <a:chExt cx="0" cy="0"/>
+        </a:xfrm>
+      </p:grpSpPr>
+      <p:pic>
+        <p:nvPicPr>
+          <p:cNvPr id="5" name="Obraz 4">
+            <a:extLst>
+              <a:ext uri="{FF2B5EF4-FFF2-40B4-BE49-F238E27FC236}">
+                <a16:creationId xmlns:a16="http://schemas.microsoft.com/office/drawing/2014/main" id="{FA2B5562-A690-428E-8278-450D1EECD2E4}"/>
+              </a:ext>
+            </a:extLst>
+          </p:cNvPr>
+          <p:cNvPicPr>
+            <a:picLocks noChangeAspect="1"/>
+          </p:cNvPicPr>
+          <p:nvPr/>
+        </p:nvPicPr>
+        <p:blipFill>
+          <a:blip r:embed="rId3">
+            <a:extLst>
+              <a:ext uri="{28A0092B-C50C-407E-A947-70E740481C1C}">
+                <a14:useLocalDpi xmlns:a14="http://schemas.microsoft.com/office/drawing/2010/main" val="0"/>
+              </a:ext>
+            </a:extLst>
+          </a:blip>
+          <a:stretch>
+            <a:fillRect/>
+          </a:stretch>
+        </p:blipFill>
+        <p:spPr>
+          <a:xfrm>
+            <a:off x="153944" y="139485"/>
+            <a:ext cx="2471463" cy="1425844"/>
+          </a:xfrm>
+          <a:prstGeom prst="rect">
+            <a:avLst/>
+          </a:prstGeom>
+        </p:spPr>
+      </p:pic>
       <p:pic>
         <p:nvPicPr>
           <p:cNvPr id="10" name="Grafika 9" descr="Strzałka — lekkie zakrzywienie">
@@ -15315,7 +18086,7 @@
 </p:sld>
 </file>
 
-<file path=ppt/slides/slide3.xml><?xml version="1.0" encoding="utf-8"?>
+<file path=ppt/slides/slide4.xml><?xml version="1.0" encoding="utf-8"?>
 <p:sld xmlns:a="http://schemas.openxmlformats.org/drawingml/2006/main" xmlns:r="http://schemas.openxmlformats.org/officeDocument/2006/relationships" xmlns:p="http://schemas.openxmlformats.org/presentationml/2006/main">
   <p:cSld>
     <p:bg>
@@ -15773,7 +18544,7 @@
 </p:sld>
 </file>
 
-<file path=ppt/slides/slide4.xml><?xml version="1.0" encoding="utf-8"?>
+<file path=ppt/slides/slide5.xml><?xml version="1.0" encoding="utf-8"?>
 <p:sld xmlns:a="http://schemas.openxmlformats.org/drawingml/2006/main" xmlns:r="http://schemas.openxmlformats.org/officeDocument/2006/relationships" xmlns:p="http://schemas.openxmlformats.org/presentationml/2006/main">
   <p:cSld>
     <p:bg>
@@ -17358,7 +20129,7 @@
 </p:sld>
 </file>
 
-<file path=ppt/slides/slide5.xml><?xml version="1.0" encoding="utf-8"?>
+<file path=ppt/slides/slide6.xml><?xml version="1.0" encoding="utf-8"?>
 <p:sld xmlns:a="http://schemas.openxmlformats.org/drawingml/2006/main" xmlns:r="http://schemas.openxmlformats.org/officeDocument/2006/relationships" xmlns:p="http://schemas.openxmlformats.org/presentationml/2006/main">
   <p:cSld>
     <p:bg>
@@ -18506,7 +21277,7 @@
 </p:sld>
 </file>
 
-<file path=ppt/slides/slide6.xml><?xml version="1.0" encoding="utf-8"?>
+<file path=ppt/slides/slide7.xml><?xml version="1.0" encoding="utf-8"?>
 <p:sld xmlns:a="http://schemas.openxmlformats.org/drawingml/2006/main" xmlns:r="http://schemas.openxmlformats.org/officeDocument/2006/relationships" xmlns:p="http://schemas.openxmlformats.org/presentationml/2006/main">
   <p:cSld>
     <p:bg>
@@ -24870,7 +27641,7 @@
 </p:sld>
 </file>
 
-<file path=ppt/slides/slide7.xml><?xml version="1.0" encoding="utf-8"?>
+<file path=ppt/slides/slide8.xml><?xml version="1.0" encoding="utf-8"?>
 <p:sld xmlns:a="http://schemas.openxmlformats.org/drawingml/2006/main" xmlns:r="http://schemas.openxmlformats.org/officeDocument/2006/relationships" xmlns:p="http://schemas.openxmlformats.org/presentationml/2006/main">
   <p:cSld>
     <p:bg>
@@ -25580,7 +28351,7 @@
 </p:sld>
 </file>
 
-<file path=ppt/slides/slide8.xml><?xml version="1.0" encoding="utf-8"?>
+<file path=ppt/slides/slide9.xml><?xml version="1.0" encoding="utf-8"?>
 <p:sld xmlns:a="http://schemas.openxmlformats.org/drawingml/2006/main" xmlns:r="http://schemas.openxmlformats.org/officeDocument/2006/relationships" xmlns:p="http://schemas.openxmlformats.org/presentationml/2006/main">
   <p:cSld>
     <p:bg>
@@ -27549,759 +30320,6 @@
 </p:sld>
 </file>
 
-<file path=ppt/slides/slide9.xml><?xml version="1.0" encoding="utf-8"?>
-<p:sld xmlns:a="http://schemas.openxmlformats.org/drawingml/2006/main" xmlns:r="http://schemas.openxmlformats.org/officeDocument/2006/relationships" xmlns:p="http://schemas.openxmlformats.org/presentationml/2006/main">
-  <p:cSld>
-    <p:bg>
-      <p:bgPr>
-        <a:gradFill>
-          <a:gsLst>
-            <a:gs pos="54000">
-              <a:srgbClr val="07A1D7"/>
-            </a:gs>
-            <a:gs pos="100000">
-              <a:srgbClr val="11CFD9"/>
-            </a:gs>
-          </a:gsLst>
-          <a:lin ang="5400000" scaled="1"/>
-        </a:gradFill>
-        <a:effectLst/>
-      </p:bgPr>
-    </p:bg>
-    <p:spTree>
-      <p:nvGrpSpPr>
-        <p:cNvPr id="1" name=""/>
-        <p:cNvGrpSpPr/>
-        <p:nvPr/>
-      </p:nvGrpSpPr>
-      <p:grpSpPr>
-        <a:xfrm>
-          <a:off x="0" y="0"/>
-          <a:ext cx="0" cy="0"/>
-          <a:chOff x="0" y="0"/>
-          <a:chExt cx="0" cy="0"/>
-        </a:xfrm>
-      </p:grpSpPr>
-      <p:pic>
-        <p:nvPicPr>
-          <p:cNvPr id="5" name="Obraz 4">
-            <a:extLst>
-              <a:ext uri="{FF2B5EF4-FFF2-40B4-BE49-F238E27FC236}">
-                <a16:creationId xmlns:a16="http://schemas.microsoft.com/office/drawing/2014/main" id="{FA2B5562-A690-428E-8278-450D1EECD2E4}"/>
-              </a:ext>
-            </a:extLst>
-          </p:cNvPr>
-          <p:cNvPicPr>
-            <a:picLocks noChangeAspect="1"/>
-          </p:cNvPicPr>
-          <p:nvPr/>
-        </p:nvPicPr>
-        <p:blipFill>
-          <a:blip r:embed="rId3">
-            <a:extLst>
-              <a:ext uri="{28A0092B-C50C-407E-A947-70E740481C1C}">
-                <a14:useLocalDpi xmlns:a14="http://schemas.microsoft.com/office/drawing/2010/main" val="0"/>
-              </a:ext>
-            </a:extLst>
-          </a:blip>
-          <a:stretch>
-            <a:fillRect/>
-          </a:stretch>
-        </p:blipFill>
-        <p:spPr>
-          <a:xfrm>
-            <a:off x="153944" y="139485"/>
-            <a:ext cx="2471463" cy="1425844"/>
-          </a:xfrm>
-          <a:prstGeom prst="rect">
-            <a:avLst/>
-          </a:prstGeom>
-        </p:spPr>
-      </p:pic>
-      <p:pic>
-        <p:nvPicPr>
-          <p:cNvPr id="10" name="Grafika 9" descr="Uścisk dłoni">
-            <a:extLst>
-              <a:ext uri="{FF2B5EF4-FFF2-40B4-BE49-F238E27FC236}">
-                <a16:creationId xmlns:a16="http://schemas.microsoft.com/office/drawing/2014/main" id="{43E8A39C-E342-4A1A-895D-358E46B367B1}"/>
-              </a:ext>
-            </a:extLst>
-          </p:cNvPr>
-          <p:cNvPicPr>
-            <a:picLocks noChangeAspect="1"/>
-          </p:cNvPicPr>
-          <p:nvPr/>
-        </p:nvPicPr>
-        <p:blipFill>
-          <a:blip r:embed="rId4">
-            <a:extLst>
-              <a:ext uri="{28A0092B-C50C-407E-A947-70E740481C1C}">
-                <a14:useLocalDpi xmlns:a14="http://schemas.microsoft.com/office/drawing/2010/main" val="0"/>
-              </a:ext>
-              <a:ext uri="{96DAC541-7B7A-43D3-8B79-37D633B846F1}">
-                <asvg:svgBlip xmlns:asvg="http://schemas.microsoft.com/office/drawing/2016/SVG/main" r:embed="rId5"/>
-              </a:ext>
-            </a:extLst>
-          </a:blip>
-          <a:stretch>
-            <a:fillRect/>
-          </a:stretch>
-        </p:blipFill>
-        <p:spPr>
-          <a:xfrm>
-            <a:off x="3805085" y="700299"/>
-            <a:ext cx="5134070" cy="5134070"/>
-          </a:xfrm>
-          <a:prstGeom prst="rect">
-            <a:avLst/>
-          </a:prstGeom>
-        </p:spPr>
-      </p:pic>
-      <p:grpSp>
-        <p:nvGrpSpPr>
-          <p:cNvPr id="16" name="Grupa 15">
-            <a:extLst>
-              <a:ext uri="{FF2B5EF4-FFF2-40B4-BE49-F238E27FC236}">
-                <a16:creationId xmlns:a16="http://schemas.microsoft.com/office/drawing/2014/main" id="{B79AE4CA-E867-44F2-9070-7D48A6C6EBD5}"/>
-              </a:ext>
-            </a:extLst>
-          </p:cNvPr>
-          <p:cNvGrpSpPr/>
-          <p:nvPr/>
-        </p:nvGrpSpPr>
-        <p:grpSpPr>
-          <a:xfrm>
-            <a:off x="8959242" y="3070653"/>
-            <a:ext cx="2941986" cy="2240648"/>
-            <a:chOff x="9315357" y="2584728"/>
-            <a:chExt cx="2941986" cy="2240648"/>
-          </a:xfrm>
-        </p:grpSpPr>
-        <p:pic>
-          <p:nvPicPr>
-            <p:cNvPr id="12" name="Grafika 11" descr="Pracownik biurowy">
-              <a:extLst>
-                <a:ext uri="{FF2B5EF4-FFF2-40B4-BE49-F238E27FC236}">
-                  <a16:creationId xmlns:a16="http://schemas.microsoft.com/office/drawing/2014/main" id="{7FF245DF-6704-4B7A-A1D6-62E8C4A789AF}"/>
-                </a:ext>
-              </a:extLst>
-            </p:cNvPr>
-            <p:cNvPicPr>
-              <a:picLocks noChangeAspect="1"/>
-            </p:cNvPicPr>
-            <p:nvPr/>
-          </p:nvPicPr>
-          <p:blipFill>
-            <a:blip r:embed="rId6">
-              <a:extLst>
-                <a:ext uri="{28A0092B-C50C-407E-A947-70E740481C1C}">
-                  <a14:useLocalDpi xmlns:a14="http://schemas.microsoft.com/office/drawing/2010/main" val="0"/>
-                </a:ext>
-                <a:ext uri="{96DAC541-7B7A-43D3-8B79-37D633B846F1}">
-                  <asvg:svgBlip xmlns:asvg="http://schemas.microsoft.com/office/drawing/2016/SVG/main" r:embed="rId7"/>
-                </a:ext>
-              </a:extLst>
-            </a:blip>
-            <a:stretch>
-              <a:fillRect/>
-            </a:stretch>
-          </p:blipFill>
-          <p:spPr>
-            <a:xfrm>
-              <a:off x="9315357" y="2584728"/>
-              <a:ext cx="1365212" cy="1365212"/>
-            </a:xfrm>
-            <a:prstGeom prst="rect">
-              <a:avLst/>
-            </a:prstGeom>
-          </p:spPr>
-        </p:pic>
-        <p:pic>
-          <p:nvPicPr>
-            <p:cNvPr id="13" name="Grafika 12" descr="Pracownik biurowy">
-              <a:extLst>
-                <a:ext uri="{FF2B5EF4-FFF2-40B4-BE49-F238E27FC236}">
-                  <a16:creationId xmlns:a16="http://schemas.microsoft.com/office/drawing/2014/main" id="{71A47239-6F38-4D6B-A727-D45C3DEB557E}"/>
-                </a:ext>
-              </a:extLst>
-            </p:cNvPr>
-            <p:cNvPicPr>
-              <a:picLocks noChangeAspect="1"/>
-            </p:cNvPicPr>
-            <p:nvPr/>
-          </p:nvPicPr>
-          <p:blipFill>
-            <a:blip r:embed="rId6">
-              <a:extLst>
-                <a:ext uri="{28A0092B-C50C-407E-A947-70E740481C1C}">
-                  <a14:useLocalDpi xmlns:a14="http://schemas.microsoft.com/office/drawing/2010/main" val="0"/>
-                </a:ext>
-                <a:ext uri="{96DAC541-7B7A-43D3-8B79-37D633B846F1}">
-                  <asvg:svgBlip xmlns:asvg="http://schemas.microsoft.com/office/drawing/2016/SVG/main" r:embed="rId7"/>
-                </a:ext>
-              </a:extLst>
-            </a:blip>
-            <a:stretch>
-              <a:fillRect/>
-            </a:stretch>
-          </p:blipFill>
-          <p:spPr>
-            <a:xfrm>
-              <a:off x="10103744" y="3460164"/>
-              <a:ext cx="1365212" cy="1365212"/>
-            </a:xfrm>
-            <a:prstGeom prst="rect">
-              <a:avLst/>
-            </a:prstGeom>
-          </p:spPr>
-        </p:pic>
-        <p:pic>
-          <p:nvPicPr>
-            <p:cNvPr id="14" name="Grafika 13" descr="Pracownik biurowy">
-              <a:extLst>
-                <a:ext uri="{FF2B5EF4-FFF2-40B4-BE49-F238E27FC236}">
-                  <a16:creationId xmlns:a16="http://schemas.microsoft.com/office/drawing/2014/main" id="{803158BE-5E55-4CE5-996A-DE4F5A66B730}"/>
-                </a:ext>
-              </a:extLst>
-            </p:cNvPr>
-            <p:cNvPicPr>
-              <a:picLocks noChangeAspect="1"/>
-            </p:cNvPicPr>
-            <p:nvPr/>
-          </p:nvPicPr>
-          <p:blipFill>
-            <a:blip r:embed="rId6">
-              <a:extLst>
-                <a:ext uri="{28A0092B-C50C-407E-A947-70E740481C1C}">
-                  <a14:useLocalDpi xmlns:a14="http://schemas.microsoft.com/office/drawing/2010/main" val="0"/>
-                </a:ext>
-                <a:ext uri="{96DAC541-7B7A-43D3-8B79-37D633B846F1}">
-                  <asvg:svgBlip xmlns:asvg="http://schemas.microsoft.com/office/drawing/2016/SVG/main" r:embed="rId7"/>
-                </a:ext>
-              </a:extLst>
-            </a:blip>
-            <a:stretch>
-              <a:fillRect/>
-            </a:stretch>
-          </p:blipFill>
-          <p:spPr>
-            <a:xfrm>
-              <a:off x="10892131" y="2900955"/>
-              <a:ext cx="1365212" cy="1365212"/>
-            </a:xfrm>
-            <a:prstGeom prst="rect">
-              <a:avLst/>
-            </a:prstGeom>
-          </p:spPr>
-        </p:pic>
-      </p:grpSp>
-      <p:grpSp>
-        <p:nvGrpSpPr>
-          <p:cNvPr id="17" name="Grupa 16">
-            <a:extLst>
-              <a:ext uri="{FF2B5EF4-FFF2-40B4-BE49-F238E27FC236}">
-                <a16:creationId xmlns:a16="http://schemas.microsoft.com/office/drawing/2014/main" id="{5375CA3A-B624-48D7-A463-FCC3F236962B}"/>
-              </a:ext>
-            </a:extLst>
-          </p:cNvPr>
-          <p:cNvGrpSpPr/>
-          <p:nvPr/>
-        </p:nvGrpSpPr>
-        <p:grpSpPr>
-          <a:xfrm>
-            <a:off x="8853461" y="3027838"/>
-            <a:ext cx="2941986" cy="2240648"/>
-            <a:chOff x="9315357" y="2584728"/>
-            <a:chExt cx="2941986" cy="2240648"/>
-          </a:xfrm>
-          <a:solidFill>
-            <a:schemeClr val="bg1"/>
-          </a:solidFill>
-        </p:grpSpPr>
-        <p:pic>
-          <p:nvPicPr>
-            <p:cNvPr id="18" name="Grafika 17" descr="Pracownik biurowy">
-              <a:extLst>
-                <a:ext uri="{FF2B5EF4-FFF2-40B4-BE49-F238E27FC236}">
-                  <a16:creationId xmlns:a16="http://schemas.microsoft.com/office/drawing/2014/main" id="{62D6BFC0-61ED-460A-952A-5366CA02274B}"/>
-                </a:ext>
-              </a:extLst>
-            </p:cNvPr>
-            <p:cNvPicPr>
-              <a:picLocks noChangeAspect="1"/>
-            </p:cNvPicPr>
-            <p:nvPr/>
-          </p:nvPicPr>
-          <p:blipFill>
-            <a:blip r:embed="rId8">
-              <a:extLst>
-                <a:ext uri="{28A0092B-C50C-407E-A947-70E740481C1C}">
-                  <a14:useLocalDpi xmlns:a14="http://schemas.microsoft.com/office/drawing/2010/main" val="0"/>
-                </a:ext>
-                <a:ext uri="{96DAC541-7B7A-43D3-8B79-37D633B846F1}">
-                  <asvg:svgBlip xmlns:asvg="http://schemas.microsoft.com/office/drawing/2016/SVG/main" r:embed="rId9"/>
-                </a:ext>
-              </a:extLst>
-            </a:blip>
-            <a:stretch>
-              <a:fillRect/>
-            </a:stretch>
-          </p:blipFill>
-          <p:spPr>
-            <a:xfrm>
-              <a:off x="9315357" y="2584728"/>
-              <a:ext cx="1365212" cy="1365212"/>
-            </a:xfrm>
-            <a:prstGeom prst="rect">
-              <a:avLst/>
-            </a:prstGeom>
-          </p:spPr>
-        </p:pic>
-        <p:pic>
-          <p:nvPicPr>
-            <p:cNvPr id="19" name="Grafika 18" descr="Pracownik biurowy">
-              <a:extLst>
-                <a:ext uri="{FF2B5EF4-FFF2-40B4-BE49-F238E27FC236}">
-                  <a16:creationId xmlns:a16="http://schemas.microsoft.com/office/drawing/2014/main" id="{F319ECBD-05AD-4FF7-AAF2-00C5983D90FE}"/>
-                </a:ext>
-              </a:extLst>
-            </p:cNvPr>
-            <p:cNvPicPr>
-              <a:picLocks noChangeAspect="1"/>
-            </p:cNvPicPr>
-            <p:nvPr/>
-          </p:nvPicPr>
-          <p:blipFill>
-            <a:blip r:embed="rId8">
-              <a:extLst>
-                <a:ext uri="{28A0092B-C50C-407E-A947-70E740481C1C}">
-                  <a14:useLocalDpi xmlns:a14="http://schemas.microsoft.com/office/drawing/2010/main" val="0"/>
-                </a:ext>
-                <a:ext uri="{96DAC541-7B7A-43D3-8B79-37D633B846F1}">
-                  <asvg:svgBlip xmlns:asvg="http://schemas.microsoft.com/office/drawing/2016/SVG/main" r:embed="rId9"/>
-                </a:ext>
-              </a:extLst>
-            </a:blip>
-            <a:stretch>
-              <a:fillRect/>
-            </a:stretch>
-          </p:blipFill>
-          <p:spPr>
-            <a:xfrm>
-              <a:off x="10103744" y="3460164"/>
-              <a:ext cx="1365212" cy="1365212"/>
-            </a:xfrm>
-            <a:prstGeom prst="rect">
-              <a:avLst/>
-            </a:prstGeom>
-          </p:spPr>
-        </p:pic>
-        <p:pic>
-          <p:nvPicPr>
-            <p:cNvPr id="20" name="Grafika 19" descr="Pracownik biurowy">
-              <a:extLst>
-                <a:ext uri="{FF2B5EF4-FFF2-40B4-BE49-F238E27FC236}">
-                  <a16:creationId xmlns:a16="http://schemas.microsoft.com/office/drawing/2014/main" id="{07285869-8BDD-4DD3-9A06-21DE9ACE8EBF}"/>
-                </a:ext>
-              </a:extLst>
-            </p:cNvPr>
-            <p:cNvPicPr>
-              <a:picLocks noChangeAspect="1"/>
-            </p:cNvPicPr>
-            <p:nvPr/>
-          </p:nvPicPr>
-          <p:blipFill>
-            <a:blip r:embed="rId8">
-              <a:extLst>
-                <a:ext uri="{28A0092B-C50C-407E-A947-70E740481C1C}">
-                  <a14:useLocalDpi xmlns:a14="http://schemas.microsoft.com/office/drawing/2010/main" val="0"/>
-                </a:ext>
-                <a:ext uri="{96DAC541-7B7A-43D3-8B79-37D633B846F1}">
-                  <asvg:svgBlip xmlns:asvg="http://schemas.microsoft.com/office/drawing/2016/SVG/main" r:embed="rId9"/>
-                </a:ext>
-              </a:extLst>
-            </a:blip>
-            <a:stretch>
-              <a:fillRect/>
-            </a:stretch>
-          </p:blipFill>
-          <p:spPr>
-            <a:xfrm>
-              <a:off x="10892131" y="2900955"/>
-              <a:ext cx="1365212" cy="1365212"/>
-            </a:xfrm>
-            <a:prstGeom prst="rect">
-              <a:avLst/>
-            </a:prstGeom>
-          </p:spPr>
-        </p:pic>
-      </p:grpSp>
-      <p:pic>
-        <p:nvPicPr>
-          <p:cNvPr id="21" name="Grafika 20" descr="Uścisk dłoni">
-            <a:extLst>
-              <a:ext uri="{FF2B5EF4-FFF2-40B4-BE49-F238E27FC236}">
-                <a16:creationId xmlns:a16="http://schemas.microsoft.com/office/drawing/2014/main" id="{8F69160B-4308-4826-94D4-890480B82D1B}"/>
-              </a:ext>
-            </a:extLst>
-          </p:cNvPr>
-          <p:cNvPicPr>
-            <a:picLocks noChangeAspect="1"/>
-          </p:cNvPicPr>
-          <p:nvPr/>
-        </p:nvPicPr>
-        <p:blipFill>
-          <a:blip r:embed="rId10">
-            <a:extLst>
-              <a:ext uri="{28A0092B-C50C-407E-A947-70E740481C1C}">
-                <a14:useLocalDpi xmlns:a14="http://schemas.microsoft.com/office/drawing/2010/main" val="0"/>
-              </a:ext>
-              <a:ext uri="{96DAC541-7B7A-43D3-8B79-37D633B846F1}">
-                <asvg:svgBlip xmlns:asvg="http://schemas.microsoft.com/office/drawing/2016/SVG/main" r:embed="rId11"/>
-              </a:ext>
-            </a:extLst>
-          </a:blip>
-          <a:stretch>
-            <a:fillRect/>
-          </a:stretch>
-        </p:blipFill>
-        <p:spPr>
-          <a:xfrm>
-            <a:off x="3784998" y="600908"/>
-            <a:ext cx="5134070" cy="5134070"/>
-          </a:xfrm>
-          <a:prstGeom prst="rect">
-            <a:avLst/>
-          </a:prstGeom>
-        </p:spPr>
-      </p:pic>
-      <p:grpSp>
-        <p:nvGrpSpPr>
-          <p:cNvPr id="2" name="Grupa 1">
-            <a:extLst>
-              <a:ext uri="{FF2B5EF4-FFF2-40B4-BE49-F238E27FC236}">
-                <a16:creationId xmlns:a16="http://schemas.microsoft.com/office/drawing/2014/main" id="{5A81BD43-8992-411B-B989-8BEA45E77262}"/>
-              </a:ext>
-            </a:extLst>
-          </p:cNvPr>
-          <p:cNvGrpSpPr/>
-          <p:nvPr/>
-        </p:nvGrpSpPr>
-        <p:grpSpPr>
-          <a:xfrm>
-            <a:off x="861707" y="2858139"/>
-            <a:ext cx="2523997" cy="2453162"/>
-            <a:chOff x="861707" y="2858139"/>
-            <a:chExt cx="2523997" cy="2453162"/>
-          </a:xfrm>
-        </p:grpSpPr>
-        <p:grpSp>
-          <p:nvGrpSpPr>
-            <p:cNvPr id="15" name="Grupa 14">
-              <a:extLst>
-                <a:ext uri="{FF2B5EF4-FFF2-40B4-BE49-F238E27FC236}">
-                  <a16:creationId xmlns:a16="http://schemas.microsoft.com/office/drawing/2014/main" id="{E6368EE1-4515-432C-8043-AAA31E47CD19}"/>
-                </a:ext>
-              </a:extLst>
-            </p:cNvPr>
-            <p:cNvGrpSpPr/>
-            <p:nvPr/>
-          </p:nvGrpSpPr>
-          <p:grpSpPr>
-            <a:xfrm>
-              <a:off x="882424" y="2974238"/>
-              <a:ext cx="2503280" cy="2337063"/>
-              <a:chOff x="901148" y="2166492"/>
-              <a:chExt cx="2503280" cy="2337063"/>
-            </a:xfrm>
-          </p:grpSpPr>
-          <p:pic>
-            <p:nvPicPr>
-              <p:cNvPr id="3" name="Grafika 2" descr="Koła zębate">
-                <a:extLst>
-                  <a:ext uri="{FF2B5EF4-FFF2-40B4-BE49-F238E27FC236}">
-                    <a16:creationId xmlns:a16="http://schemas.microsoft.com/office/drawing/2014/main" id="{94B09A1F-458C-46E9-B416-502D546E35C4}"/>
-                  </a:ext>
-                </a:extLst>
-              </p:cNvPr>
-              <p:cNvPicPr>
-                <a:picLocks noChangeAspect="1"/>
-              </p:cNvPicPr>
-              <p:nvPr/>
-            </p:nvPicPr>
-            <p:blipFill>
-              <a:blip r:embed="rId12">
-                <a:extLst>
-                  <a:ext uri="{28A0092B-C50C-407E-A947-70E740481C1C}">
-                    <a14:useLocalDpi xmlns:a14="http://schemas.microsoft.com/office/drawing/2010/main" val="0"/>
-                  </a:ext>
-                  <a:ext uri="{96DAC541-7B7A-43D3-8B79-37D633B846F1}">
-                    <asvg:svgBlip xmlns:asvg="http://schemas.microsoft.com/office/drawing/2016/SVG/main" r:embed="rId13"/>
-                  </a:ext>
-                </a:extLst>
-              </a:blip>
-              <a:stretch>
-                <a:fillRect/>
-              </a:stretch>
-            </p:blipFill>
-            <p:spPr>
-              <a:xfrm>
-                <a:off x="1846386" y="2945513"/>
-                <a:ext cx="1558042" cy="1558042"/>
-              </a:xfrm>
-              <a:prstGeom prst="rect">
-                <a:avLst/>
-              </a:prstGeom>
-            </p:spPr>
-          </p:pic>
-          <p:pic>
-            <p:nvPicPr>
-              <p:cNvPr id="6" name="Grafika 5" descr="Pojedyncze koło zębate">
-                <a:extLst>
-                  <a:ext uri="{FF2B5EF4-FFF2-40B4-BE49-F238E27FC236}">
-                    <a16:creationId xmlns:a16="http://schemas.microsoft.com/office/drawing/2014/main" id="{C5809225-676D-43FD-ACA7-F35351E42C82}"/>
-                  </a:ext>
-                </a:extLst>
-              </p:cNvPr>
-              <p:cNvPicPr>
-                <a:picLocks noChangeAspect="1"/>
-              </p:cNvPicPr>
-              <p:nvPr/>
-            </p:nvPicPr>
-            <p:blipFill>
-              <a:blip r:embed="rId14">
-                <a:extLst>
-                  <a:ext uri="{28A0092B-C50C-407E-A947-70E740481C1C}">
-                    <a14:useLocalDpi xmlns:a14="http://schemas.microsoft.com/office/drawing/2010/main" val="0"/>
-                  </a:ext>
-                  <a:ext uri="{96DAC541-7B7A-43D3-8B79-37D633B846F1}">
-                    <asvg:svgBlip xmlns:asvg="http://schemas.microsoft.com/office/drawing/2016/SVG/main" r:embed="rId15"/>
-                  </a:ext>
-                </a:extLst>
-              </a:blip>
-              <a:stretch>
-                <a:fillRect/>
-              </a:stretch>
-            </p:blipFill>
-            <p:spPr>
-              <a:xfrm>
-                <a:off x="901148" y="2166492"/>
-                <a:ext cx="1558042" cy="1558042"/>
-              </a:xfrm>
-              <a:prstGeom prst="rect">
-                <a:avLst/>
-              </a:prstGeom>
-            </p:spPr>
-          </p:pic>
-        </p:grpSp>
-        <p:grpSp>
-          <p:nvGrpSpPr>
-            <p:cNvPr id="22" name="Grupa 21">
-              <a:extLst>
-                <a:ext uri="{FF2B5EF4-FFF2-40B4-BE49-F238E27FC236}">
-                  <a16:creationId xmlns:a16="http://schemas.microsoft.com/office/drawing/2014/main" id="{1FA60A96-DD3B-4249-A8FD-06889D1000F7}"/>
-                </a:ext>
-              </a:extLst>
-            </p:cNvPr>
-            <p:cNvGrpSpPr/>
-            <p:nvPr/>
-          </p:nvGrpSpPr>
-          <p:grpSpPr>
-            <a:xfrm>
-              <a:off x="861707" y="2858139"/>
-              <a:ext cx="2503280" cy="2337063"/>
-              <a:chOff x="901148" y="2166492"/>
-              <a:chExt cx="2503280" cy="2337063"/>
-            </a:xfrm>
-            <a:solidFill>
-              <a:schemeClr val="bg1"/>
-            </a:solidFill>
-          </p:grpSpPr>
-          <p:pic>
-            <p:nvPicPr>
-              <p:cNvPr id="23" name="Grafika 22" descr="Koła zębate">
-                <a:extLst>
-                  <a:ext uri="{FF2B5EF4-FFF2-40B4-BE49-F238E27FC236}">
-                    <a16:creationId xmlns:a16="http://schemas.microsoft.com/office/drawing/2014/main" id="{F7D551CB-0B57-4934-9549-B11C5DFA865F}"/>
-                  </a:ext>
-                </a:extLst>
-              </p:cNvPr>
-              <p:cNvPicPr>
-                <a:picLocks noChangeAspect="1"/>
-              </p:cNvPicPr>
-              <p:nvPr/>
-            </p:nvPicPr>
-            <p:blipFill>
-              <a:blip r:embed="rId16">
-                <a:extLst>
-                  <a:ext uri="{28A0092B-C50C-407E-A947-70E740481C1C}">
-                    <a14:useLocalDpi xmlns:a14="http://schemas.microsoft.com/office/drawing/2010/main" val="0"/>
-                  </a:ext>
-                  <a:ext uri="{96DAC541-7B7A-43D3-8B79-37D633B846F1}">
-                    <asvg:svgBlip xmlns:asvg="http://schemas.microsoft.com/office/drawing/2016/SVG/main" r:embed="rId17"/>
-                  </a:ext>
-                </a:extLst>
-              </a:blip>
-              <a:stretch>
-                <a:fillRect/>
-              </a:stretch>
-            </p:blipFill>
-            <p:spPr>
-              <a:xfrm>
-                <a:off x="1846386" y="2945513"/>
-                <a:ext cx="1558042" cy="1558042"/>
-              </a:xfrm>
-              <a:prstGeom prst="rect">
-                <a:avLst/>
-              </a:prstGeom>
-            </p:spPr>
-          </p:pic>
-          <p:pic>
-            <p:nvPicPr>
-              <p:cNvPr id="24" name="Grafika 23" descr="Pojedyncze koło zębate">
-                <a:extLst>
-                  <a:ext uri="{FF2B5EF4-FFF2-40B4-BE49-F238E27FC236}">
-                    <a16:creationId xmlns:a16="http://schemas.microsoft.com/office/drawing/2014/main" id="{5AB7828F-3C3D-4C2E-9258-4BE0996DA181}"/>
-                  </a:ext>
-                </a:extLst>
-              </p:cNvPr>
-              <p:cNvPicPr>
-                <a:picLocks noChangeAspect="1"/>
-              </p:cNvPicPr>
-              <p:nvPr/>
-            </p:nvPicPr>
-            <p:blipFill>
-              <a:blip r:embed="rId18">
-                <a:extLst>
-                  <a:ext uri="{28A0092B-C50C-407E-A947-70E740481C1C}">
-                    <a14:useLocalDpi xmlns:a14="http://schemas.microsoft.com/office/drawing/2010/main" val="0"/>
-                  </a:ext>
-                  <a:ext uri="{96DAC541-7B7A-43D3-8B79-37D633B846F1}">
-                    <asvg:svgBlip xmlns:asvg="http://schemas.microsoft.com/office/drawing/2016/SVG/main" r:embed="rId19"/>
-                  </a:ext>
-                </a:extLst>
-              </a:blip>
-              <a:stretch>
-                <a:fillRect/>
-              </a:stretch>
-            </p:blipFill>
-            <p:spPr>
-              <a:xfrm>
-                <a:off x="901148" y="2166492"/>
-                <a:ext cx="1558042" cy="1558042"/>
-              </a:xfrm>
-              <a:prstGeom prst="rect">
-                <a:avLst/>
-              </a:prstGeom>
-            </p:spPr>
-          </p:pic>
-        </p:grpSp>
-      </p:grpSp>
-      <p:sp>
-        <p:nvSpPr>
-          <p:cNvPr id="25" name="Prostokąt 24">
-            <a:extLst>
-              <a:ext uri="{FF2B5EF4-FFF2-40B4-BE49-F238E27FC236}">
-                <a16:creationId xmlns:a16="http://schemas.microsoft.com/office/drawing/2014/main" id="{7552D539-ACA4-436B-B2ED-44A4CAA474F2}"/>
-              </a:ext>
-            </a:extLst>
-          </p:cNvPr>
-          <p:cNvSpPr/>
-          <p:nvPr/>
-        </p:nvSpPr>
-        <p:spPr>
-          <a:xfrm>
-            <a:off x="4909620" y="4752092"/>
-            <a:ext cx="2925000" cy="1754326"/>
-          </a:xfrm>
-          <a:prstGeom prst="rect">
-            <a:avLst/>
-          </a:prstGeom>
-          <a:noFill/>
-        </p:spPr>
-        <p:txBody>
-          <a:bodyPr wrap="square" lIns="91440" tIns="45720" rIns="91440" bIns="45720">
-            <a:spAutoFit/>
-          </a:bodyPr>
-          <a:lstStyle/>
-          <a:p>
-            <a:pPr algn="ctr"/>
-            <a:r>
-              <a:rPr lang="pl-PL" sz="5400" b="1" dirty="0">
-                <a:ln w="10160">
-                  <a:solidFill>
-                    <a:schemeClr val="accent5"/>
-                  </a:solidFill>
-                  <a:prstDash val="solid"/>
-                </a:ln>
-                <a:solidFill>
-                  <a:srgbClr val="FFFFFF"/>
-                </a:solidFill>
-                <a:effectLst>
-                  <a:outerShdw blurRad="38100" dist="22860" dir="5400000" algn="tl" rotWithShape="0">
-                    <a:srgbClr val="000000">
-                      <a:alpha val="30000"/>
-                    </a:srgbClr>
-                  </a:outerShdw>
-                </a:effectLst>
-              </a:rPr>
-              <a:t>Business </a:t>
-            </a:r>
-            <a:r>
-              <a:rPr lang="pl-PL" sz="5400" b="1" dirty="0" err="1">
-                <a:ln w="10160">
-                  <a:solidFill>
-                    <a:schemeClr val="accent5"/>
-                  </a:solidFill>
-                  <a:prstDash val="solid"/>
-                </a:ln>
-                <a:solidFill>
-                  <a:srgbClr val="FFFFFF"/>
-                </a:solidFill>
-                <a:effectLst>
-                  <a:outerShdw blurRad="38100" dist="22860" dir="5400000" algn="tl" rotWithShape="0">
-                    <a:srgbClr val="000000">
-                      <a:alpha val="30000"/>
-                    </a:srgbClr>
-                  </a:outerShdw>
-                </a:effectLst>
-              </a:rPr>
-              <a:t>first</a:t>
-            </a:r>
-            <a:endParaRPr lang="pl-PL" sz="5400" b="1" cap="none" spc="0" dirty="0">
-              <a:ln w="10160">
-                <a:solidFill>
-                  <a:schemeClr val="accent5"/>
-                </a:solidFill>
-                <a:prstDash val="solid"/>
-              </a:ln>
-              <a:solidFill>
-                <a:srgbClr val="FFFFFF"/>
-              </a:solidFill>
-              <a:effectLst>
-                <a:outerShdw blurRad="38100" dist="22860" dir="5400000" algn="tl" rotWithShape="0">
-                  <a:srgbClr val="000000">
-                    <a:alpha val="30000"/>
-                  </a:srgbClr>
-                </a:outerShdw>
-              </a:effectLst>
-            </a:endParaRPr>
-          </a:p>
-        </p:txBody>
-      </p:sp>
-    </p:spTree>
-    <p:extLst>
-      <p:ext uri="{BB962C8B-B14F-4D97-AF65-F5344CB8AC3E}">
-        <p14:creationId xmlns:p14="http://schemas.microsoft.com/office/powerpoint/2010/main" val="2630656502"/>
-      </p:ext>
-    </p:extLst>
-  </p:cSld>
-  <p:clrMapOvr>
-    <a:masterClrMapping/>
-  </p:clrMapOvr>
-</p:sld>
-</file>
-
 <file path=ppt/theme/theme1.xml><?xml version="1.0" encoding="utf-8"?>
 <a:theme xmlns:a="http://schemas.openxmlformats.org/drawingml/2006/main" name="Motyw pakietu Office">
   <a:themeElements>

</xml_diff>